<commit_message>
Add .DS_Store files to .gitignore and update DocumentChunk model with meta_data attribute
</commit_message>
<xml_diff>
--- a/tests/fixtures/sample_data/example.pptx
+++ b/tests/fixtures/sample_data/example.pptx
@@ -9,6 +9,7 @@
     <p:sldId id="257" r:id="rId3"/>
     <p:sldId id="258" r:id="rId4"/>
     <p:sldId id="259" r:id="rId5"/>
+    <p:sldId id="260" r:id="rId6"/>
   </p:sldIdLst>
   <p:sldSz cx="12192000" cy="6858000"/>
   <p:notesSz cx="6858000" cy="9144000"/>
@@ -107,7 +108,2066 @@
       </a:defRPr>
     </a:lvl9pPr>
   </p:defaultTextStyle>
+  <p:extLst>
+    <p:ext uri="{EFAFB233-063F-42B5-8137-9DF3F51BA10A}">
+      <p15:sldGuideLst xmlns:p15="http://schemas.microsoft.com/office/powerpoint/2012/main"/>
+    </p:ext>
+  </p:extLst>
 </p:presentation>
+</file>
+
+<file path=ppt/charts/chart1.xml><?xml version="1.0" encoding="utf-8"?>
+<c:chartSpace xmlns:c="http://schemas.openxmlformats.org/drawingml/2006/chart" xmlns:a="http://schemas.openxmlformats.org/drawingml/2006/main" xmlns:r="http://schemas.openxmlformats.org/officeDocument/2006/relationships" xmlns:c16r2="http://schemas.microsoft.com/office/drawing/2015/06/chart">
+  <c:date1904 val="0"/>
+  <c:lang val="en-US"/>
+  <c:roundedCorners val="0"/>
+  <mc:AlternateContent xmlns:mc="http://schemas.openxmlformats.org/markup-compatibility/2006">
+    <mc:Choice xmlns:c14="http://schemas.microsoft.com/office/drawing/2007/8/2/chart" Requires="c14">
+      <c14:style val="102"/>
+    </mc:Choice>
+    <mc:Fallback>
+      <c:style val="2"/>
+    </mc:Fallback>
+  </mc:AlternateContent>
+  <c:chart>
+    <c:title>
+      <c:tx>
+        <c:rich>
+          <a:bodyPr rot="0" spcFirstLastPara="1" vertOverflow="ellipsis" vert="horz" wrap="square" anchor="ctr" anchorCtr="1"/>
+          <a:lstStyle/>
+          <a:p>
+            <a:pPr>
+              <a:defRPr sz="1862" b="0" i="0" u="none" strike="noStrike" kern="1200" spc="0" baseline="0">
+                <a:solidFill>
+                  <a:schemeClr val="tx1">
+                    <a:lumMod val="65000"/>
+                    <a:lumOff val="35000"/>
+                  </a:schemeClr>
+                </a:solidFill>
+                <a:latin typeface="+mn-lt"/>
+                <a:ea typeface="+mn-ea"/>
+                <a:cs typeface="+mn-cs"/>
+              </a:defRPr>
+            </a:pPr>
+            <a:r>
+              <a:rPr lang="en-US" dirty="0"/>
+              <a:t>Chart One</a:t>
+            </a:r>
+          </a:p>
+        </c:rich>
+      </c:tx>
+      <c:overlay val="0"/>
+      <c:spPr>
+        <a:noFill/>
+        <a:ln>
+          <a:noFill/>
+        </a:ln>
+        <a:effectLst/>
+      </c:spPr>
+      <c:txPr>
+        <a:bodyPr rot="0" spcFirstLastPara="1" vertOverflow="ellipsis" vert="horz" wrap="square" anchor="ctr" anchorCtr="1"/>
+        <a:lstStyle/>
+        <a:p>
+          <a:pPr>
+            <a:defRPr sz="1862" b="0" i="0" u="none" strike="noStrike" kern="1200" spc="0" baseline="0">
+              <a:solidFill>
+                <a:schemeClr val="tx1">
+                  <a:lumMod val="65000"/>
+                  <a:lumOff val="35000"/>
+                </a:schemeClr>
+              </a:solidFill>
+              <a:latin typeface="+mn-lt"/>
+              <a:ea typeface="+mn-ea"/>
+              <a:cs typeface="+mn-cs"/>
+            </a:defRPr>
+          </a:pPr>
+          <a:endParaRPr lang="en-US"/>
+        </a:p>
+      </c:txPr>
+    </c:title>
+    <c:autoTitleDeleted val="0"/>
+    <c:plotArea>
+      <c:layout/>
+      <c:barChart>
+        <c:barDir val="col"/>
+        <c:grouping val="stacked"/>
+        <c:varyColors val="0"/>
+        <c:ser>
+          <c:idx val="0"/>
+          <c:order val="0"/>
+          <c:tx>
+            <c:strRef>
+              <c:f>Sheet1!$B$1</c:f>
+              <c:strCache>
+                <c:ptCount val="1"/>
+                <c:pt idx="0">
+                  <c:v>Series 1</c:v>
+                </c:pt>
+              </c:strCache>
+            </c:strRef>
+          </c:tx>
+          <c:spPr>
+            <a:solidFill>
+              <a:schemeClr val="accent1"/>
+            </a:solidFill>
+            <a:ln>
+              <a:noFill/>
+            </a:ln>
+            <a:effectLst/>
+          </c:spPr>
+          <c:invertIfNegative val="0"/>
+          <c:cat>
+            <c:strRef>
+              <c:f>Sheet1!$A$2:$A$5</c:f>
+              <c:strCache>
+                <c:ptCount val="4"/>
+                <c:pt idx="0">
+                  <c:v>Category 1</c:v>
+                </c:pt>
+                <c:pt idx="1">
+                  <c:v>Category 2</c:v>
+                </c:pt>
+                <c:pt idx="2">
+                  <c:v>Category 3</c:v>
+                </c:pt>
+                <c:pt idx="3">
+                  <c:v>Category 4</c:v>
+                </c:pt>
+              </c:strCache>
+            </c:strRef>
+          </c:cat>
+          <c:val>
+            <c:numRef>
+              <c:f>Sheet1!$B$2:$B$5</c:f>
+              <c:numCache>
+                <c:formatCode>General</c:formatCode>
+                <c:ptCount val="4"/>
+                <c:pt idx="0">
+                  <c:v>4.3</c:v>
+                </c:pt>
+                <c:pt idx="1">
+                  <c:v>2.5</c:v>
+                </c:pt>
+                <c:pt idx="2">
+                  <c:v>3.5</c:v>
+                </c:pt>
+                <c:pt idx="3">
+                  <c:v>4.5</c:v>
+                </c:pt>
+              </c:numCache>
+            </c:numRef>
+          </c:val>
+          <c:extLst>
+            <c:ext xmlns:c16="http://schemas.microsoft.com/office/drawing/2014/chart" uri="{C3380CC4-5D6E-409C-BE32-E72D297353CC}">
+              <c16:uniqueId val="{00000000-90E3-ED4F-BD17-82D81DF9D9D1}"/>
+            </c:ext>
+          </c:extLst>
+        </c:ser>
+        <c:ser>
+          <c:idx val="1"/>
+          <c:order val="1"/>
+          <c:tx>
+            <c:strRef>
+              <c:f>Sheet1!$C$1</c:f>
+              <c:strCache>
+                <c:ptCount val="1"/>
+                <c:pt idx="0">
+                  <c:v>Series 2</c:v>
+                </c:pt>
+              </c:strCache>
+            </c:strRef>
+          </c:tx>
+          <c:spPr>
+            <a:solidFill>
+              <a:schemeClr val="accent2"/>
+            </a:solidFill>
+            <a:ln>
+              <a:noFill/>
+            </a:ln>
+            <a:effectLst/>
+          </c:spPr>
+          <c:invertIfNegative val="0"/>
+          <c:cat>
+            <c:strRef>
+              <c:f>Sheet1!$A$2:$A$5</c:f>
+              <c:strCache>
+                <c:ptCount val="4"/>
+                <c:pt idx="0">
+                  <c:v>Category 1</c:v>
+                </c:pt>
+                <c:pt idx="1">
+                  <c:v>Category 2</c:v>
+                </c:pt>
+                <c:pt idx="2">
+                  <c:v>Category 3</c:v>
+                </c:pt>
+                <c:pt idx="3">
+                  <c:v>Category 4</c:v>
+                </c:pt>
+              </c:strCache>
+            </c:strRef>
+          </c:cat>
+          <c:val>
+            <c:numRef>
+              <c:f>Sheet1!$C$2:$C$5</c:f>
+              <c:numCache>
+                <c:formatCode>General</c:formatCode>
+                <c:ptCount val="4"/>
+                <c:pt idx="0">
+                  <c:v>2.4</c:v>
+                </c:pt>
+                <c:pt idx="1">
+                  <c:v>4.4000000000000004</c:v>
+                </c:pt>
+                <c:pt idx="2">
+                  <c:v>1.8</c:v>
+                </c:pt>
+                <c:pt idx="3">
+                  <c:v>2.8</c:v>
+                </c:pt>
+              </c:numCache>
+            </c:numRef>
+          </c:val>
+          <c:extLst>
+            <c:ext xmlns:c16="http://schemas.microsoft.com/office/drawing/2014/chart" uri="{C3380CC4-5D6E-409C-BE32-E72D297353CC}">
+              <c16:uniqueId val="{00000001-90E3-ED4F-BD17-82D81DF9D9D1}"/>
+            </c:ext>
+          </c:extLst>
+        </c:ser>
+        <c:ser>
+          <c:idx val="2"/>
+          <c:order val="2"/>
+          <c:tx>
+            <c:strRef>
+              <c:f>Sheet1!$D$1</c:f>
+              <c:strCache>
+                <c:ptCount val="1"/>
+                <c:pt idx="0">
+                  <c:v>Series 3</c:v>
+                </c:pt>
+              </c:strCache>
+            </c:strRef>
+          </c:tx>
+          <c:spPr>
+            <a:solidFill>
+              <a:schemeClr val="accent3"/>
+            </a:solidFill>
+            <a:ln>
+              <a:noFill/>
+            </a:ln>
+            <a:effectLst/>
+          </c:spPr>
+          <c:invertIfNegative val="0"/>
+          <c:cat>
+            <c:strRef>
+              <c:f>Sheet1!$A$2:$A$5</c:f>
+              <c:strCache>
+                <c:ptCount val="4"/>
+                <c:pt idx="0">
+                  <c:v>Category 1</c:v>
+                </c:pt>
+                <c:pt idx="1">
+                  <c:v>Category 2</c:v>
+                </c:pt>
+                <c:pt idx="2">
+                  <c:v>Category 3</c:v>
+                </c:pt>
+                <c:pt idx="3">
+                  <c:v>Category 4</c:v>
+                </c:pt>
+              </c:strCache>
+            </c:strRef>
+          </c:cat>
+          <c:val>
+            <c:numRef>
+              <c:f>Sheet1!$D$2:$D$5</c:f>
+              <c:numCache>
+                <c:formatCode>General</c:formatCode>
+                <c:ptCount val="4"/>
+                <c:pt idx="0">
+                  <c:v>2</c:v>
+                </c:pt>
+                <c:pt idx="1">
+                  <c:v>2</c:v>
+                </c:pt>
+                <c:pt idx="2">
+                  <c:v>3</c:v>
+                </c:pt>
+                <c:pt idx="3">
+                  <c:v>5</c:v>
+                </c:pt>
+              </c:numCache>
+            </c:numRef>
+          </c:val>
+          <c:extLst>
+            <c:ext xmlns:c16="http://schemas.microsoft.com/office/drawing/2014/chart" uri="{C3380CC4-5D6E-409C-BE32-E72D297353CC}">
+              <c16:uniqueId val="{00000002-90E3-ED4F-BD17-82D81DF9D9D1}"/>
+            </c:ext>
+          </c:extLst>
+        </c:ser>
+        <c:dLbls>
+          <c:showLegendKey val="0"/>
+          <c:showVal val="0"/>
+          <c:showCatName val="0"/>
+          <c:showSerName val="0"/>
+          <c:showPercent val="0"/>
+          <c:showBubbleSize val="0"/>
+        </c:dLbls>
+        <c:gapWidth val="150"/>
+        <c:overlap val="100"/>
+        <c:axId val="721249679"/>
+        <c:axId val="396872256"/>
+      </c:barChart>
+      <c:catAx>
+        <c:axId val="721249679"/>
+        <c:scaling>
+          <c:orientation val="minMax"/>
+        </c:scaling>
+        <c:delete val="0"/>
+        <c:axPos val="b"/>
+        <c:numFmt formatCode="General" sourceLinked="1"/>
+        <c:majorTickMark val="none"/>
+        <c:minorTickMark val="none"/>
+        <c:tickLblPos val="nextTo"/>
+        <c:spPr>
+          <a:noFill/>
+          <a:ln w="9525" cap="flat" cmpd="sng" algn="ctr">
+            <a:solidFill>
+              <a:schemeClr val="tx1">
+                <a:lumMod val="15000"/>
+                <a:lumOff val="85000"/>
+              </a:schemeClr>
+            </a:solidFill>
+            <a:round/>
+          </a:ln>
+          <a:effectLst/>
+        </c:spPr>
+        <c:txPr>
+          <a:bodyPr rot="-60000000" spcFirstLastPara="1" vertOverflow="ellipsis" vert="horz" wrap="square" anchor="ctr" anchorCtr="1"/>
+          <a:lstStyle/>
+          <a:p>
+            <a:pPr>
+              <a:defRPr sz="1197" b="0" i="0" u="none" strike="noStrike" kern="1200" baseline="0">
+                <a:solidFill>
+                  <a:schemeClr val="tx1">
+                    <a:lumMod val="65000"/>
+                    <a:lumOff val="35000"/>
+                  </a:schemeClr>
+                </a:solidFill>
+                <a:latin typeface="+mn-lt"/>
+                <a:ea typeface="+mn-ea"/>
+                <a:cs typeface="+mn-cs"/>
+              </a:defRPr>
+            </a:pPr>
+            <a:endParaRPr lang="en-US"/>
+          </a:p>
+        </c:txPr>
+        <c:crossAx val="396872256"/>
+        <c:crosses val="autoZero"/>
+        <c:auto val="1"/>
+        <c:lblAlgn val="ctr"/>
+        <c:lblOffset val="100"/>
+        <c:noMultiLvlLbl val="0"/>
+      </c:catAx>
+      <c:valAx>
+        <c:axId val="396872256"/>
+        <c:scaling>
+          <c:orientation val="minMax"/>
+        </c:scaling>
+        <c:delete val="0"/>
+        <c:axPos val="l"/>
+        <c:majorGridlines>
+          <c:spPr>
+            <a:ln w="9525" cap="flat" cmpd="sng" algn="ctr">
+              <a:solidFill>
+                <a:schemeClr val="tx1">
+                  <a:lumMod val="15000"/>
+                  <a:lumOff val="85000"/>
+                </a:schemeClr>
+              </a:solidFill>
+              <a:round/>
+            </a:ln>
+            <a:effectLst/>
+          </c:spPr>
+        </c:majorGridlines>
+        <c:numFmt formatCode="General" sourceLinked="1"/>
+        <c:majorTickMark val="none"/>
+        <c:minorTickMark val="none"/>
+        <c:tickLblPos val="nextTo"/>
+        <c:spPr>
+          <a:noFill/>
+          <a:ln>
+            <a:noFill/>
+          </a:ln>
+          <a:effectLst/>
+        </c:spPr>
+        <c:txPr>
+          <a:bodyPr rot="-60000000" spcFirstLastPara="1" vertOverflow="ellipsis" vert="horz" wrap="square" anchor="ctr" anchorCtr="1"/>
+          <a:lstStyle/>
+          <a:p>
+            <a:pPr>
+              <a:defRPr sz="1197" b="0" i="0" u="none" strike="noStrike" kern="1200" baseline="0">
+                <a:solidFill>
+                  <a:schemeClr val="tx1">
+                    <a:lumMod val="65000"/>
+                    <a:lumOff val="35000"/>
+                  </a:schemeClr>
+                </a:solidFill>
+                <a:latin typeface="+mn-lt"/>
+                <a:ea typeface="+mn-ea"/>
+                <a:cs typeface="+mn-cs"/>
+              </a:defRPr>
+            </a:pPr>
+            <a:endParaRPr lang="en-US"/>
+          </a:p>
+        </c:txPr>
+        <c:crossAx val="721249679"/>
+        <c:crosses val="autoZero"/>
+        <c:crossBetween val="between"/>
+      </c:valAx>
+      <c:spPr>
+        <a:noFill/>
+        <a:ln>
+          <a:noFill/>
+        </a:ln>
+        <a:effectLst/>
+      </c:spPr>
+    </c:plotArea>
+    <c:legend>
+      <c:legendPos val="b"/>
+      <c:overlay val="0"/>
+      <c:spPr>
+        <a:noFill/>
+        <a:ln>
+          <a:noFill/>
+        </a:ln>
+        <a:effectLst/>
+      </c:spPr>
+      <c:txPr>
+        <a:bodyPr rot="0" spcFirstLastPara="1" vertOverflow="ellipsis" vert="horz" wrap="square" anchor="ctr" anchorCtr="1"/>
+        <a:lstStyle/>
+        <a:p>
+          <a:pPr>
+            <a:defRPr sz="1197" b="0" i="0" u="none" strike="noStrike" kern="1200" baseline="0">
+              <a:solidFill>
+                <a:schemeClr val="tx1">
+                  <a:lumMod val="65000"/>
+                  <a:lumOff val="35000"/>
+                </a:schemeClr>
+              </a:solidFill>
+              <a:latin typeface="+mn-lt"/>
+              <a:ea typeface="+mn-ea"/>
+              <a:cs typeface="+mn-cs"/>
+            </a:defRPr>
+          </a:pPr>
+          <a:endParaRPr lang="en-US"/>
+        </a:p>
+      </c:txPr>
+    </c:legend>
+    <c:plotVisOnly val="1"/>
+    <c:dispBlanksAs val="gap"/>
+    <c:extLst>
+      <c:ext xmlns:c16r3="http://schemas.microsoft.com/office/drawing/2017/03/chart" uri="{56B9EC1D-385E-4148-901F-78D8002777C0}">
+        <c16r3:dataDisplayOptions16>
+          <c16r3:dispNaAsBlank val="1"/>
+        </c16r3:dataDisplayOptions16>
+      </c:ext>
+    </c:extLst>
+    <c:showDLblsOverMax val="0"/>
+  </c:chart>
+  <c:spPr>
+    <a:noFill/>
+    <a:ln>
+      <a:noFill/>
+    </a:ln>
+    <a:effectLst/>
+  </c:spPr>
+  <c:txPr>
+    <a:bodyPr/>
+    <a:lstStyle/>
+    <a:p>
+      <a:pPr>
+        <a:defRPr/>
+      </a:pPr>
+      <a:endParaRPr lang="en-US"/>
+    </a:p>
+  </c:txPr>
+  <c:externalData r:id="rId3">
+    <c:autoUpdate val="0"/>
+  </c:externalData>
+</c:chartSpace>
+</file>
+
+<file path=ppt/charts/chart2.xml><?xml version="1.0" encoding="utf-8"?>
+<c:chartSpace xmlns:c="http://schemas.openxmlformats.org/drawingml/2006/chart" xmlns:a="http://schemas.openxmlformats.org/drawingml/2006/main" xmlns:r="http://schemas.openxmlformats.org/officeDocument/2006/relationships" xmlns:c16r2="http://schemas.microsoft.com/office/drawing/2015/06/chart">
+  <c:date1904 val="0"/>
+  <c:lang val="en-US"/>
+  <c:roundedCorners val="0"/>
+  <mc:AlternateContent xmlns:mc="http://schemas.openxmlformats.org/markup-compatibility/2006">
+    <mc:Choice xmlns:c14="http://schemas.microsoft.com/office/drawing/2007/8/2/chart" Requires="c14">
+      <c14:style val="102"/>
+    </mc:Choice>
+    <mc:Fallback>
+      <c:style val="2"/>
+    </mc:Fallback>
+  </mc:AlternateContent>
+  <c:chart>
+    <c:title>
+      <c:tx>
+        <c:rich>
+          <a:bodyPr rot="0" spcFirstLastPara="1" vertOverflow="ellipsis" vert="horz" wrap="square" anchor="ctr" anchorCtr="1"/>
+          <a:lstStyle/>
+          <a:p>
+            <a:pPr>
+              <a:defRPr sz="1862" b="0" i="0" u="none" strike="noStrike" kern="1200" spc="0" baseline="0">
+                <a:solidFill>
+                  <a:schemeClr val="tx1">
+                    <a:lumMod val="65000"/>
+                    <a:lumOff val="35000"/>
+                  </a:schemeClr>
+                </a:solidFill>
+                <a:latin typeface="+mn-lt"/>
+                <a:ea typeface="+mn-ea"/>
+                <a:cs typeface="+mn-cs"/>
+              </a:defRPr>
+            </a:pPr>
+            <a:r>
+              <a:rPr lang="en-US" dirty="0"/>
+              <a:t>Chart Two</a:t>
+            </a:r>
+          </a:p>
+        </c:rich>
+      </c:tx>
+      <c:overlay val="0"/>
+      <c:spPr>
+        <a:noFill/>
+        <a:ln>
+          <a:noFill/>
+        </a:ln>
+        <a:effectLst/>
+      </c:spPr>
+      <c:txPr>
+        <a:bodyPr rot="0" spcFirstLastPara="1" vertOverflow="ellipsis" vert="horz" wrap="square" anchor="ctr" anchorCtr="1"/>
+        <a:lstStyle/>
+        <a:p>
+          <a:pPr>
+            <a:defRPr sz="1862" b="0" i="0" u="none" strike="noStrike" kern="1200" spc="0" baseline="0">
+              <a:solidFill>
+                <a:schemeClr val="tx1">
+                  <a:lumMod val="65000"/>
+                  <a:lumOff val="35000"/>
+                </a:schemeClr>
+              </a:solidFill>
+              <a:latin typeface="+mn-lt"/>
+              <a:ea typeface="+mn-ea"/>
+              <a:cs typeface="+mn-cs"/>
+            </a:defRPr>
+          </a:pPr>
+          <a:endParaRPr lang="en-US"/>
+        </a:p>
+      </c:txPr>
+    </c:title>
+    <c:autoTitleDeleted val="0"/>
+    <c:plotArea>
+      <c:layout/>
+      <c:barChart>
+        <c:barDir val="col"/>
+        <c:grouping val="stacked"/>
+        <c:varyColors val="0"/>
+        <c:ser>
+          <c:idx val="0"/>
+          <c:order val="0"/>
+          <c:tx>
+            <c:strRef>
+              <c:f>Sheet1!$B$1</c:f>
+              <c:strCache>
+                <c:ptCount val="1"/>
+                <c:pt idx="0">
+                  <c:v>Series 1</c:v>
+                </c:pt>
+              </c:strCache>
+            </c:strRef>
+          </c:tx>
+          <c:spPr>
+            <a:solidFill>
+              <a:schemeClr val="accent1"/>
+            </a:solidFill>
+            <a:ln>
+              <a:noFill/>
+            </a:ln>
+            <a:effectLst/>
+          </c:spPr>
+          <c:invertIfNegative val="0"/>
+          <c:cat>
+            <c:strRef>
+              <c:f>Sheet1!$A$2:$A$5</c:f>
+              <c:strCache>
+                <c:ptCount val="4"/>
+                <c:pt idx="0">
+                  <c:v>Category 1</c:v>
+                </c:pt>
+                <c:pt idx="1">
+                  <c:v>Category 2</c:v>
+                </c:pt>
+                <c:pt idx="2">
+                  <c:v>Category 3</c:v>
+                </c:pt>
+                <c:pt idx="3">
+                  <c:v>Category 4</c:v>
+                </c:pt>
+              </c:strCache>
+            </c:strRef>
+          </c:cat>
+          <c:val>
+            <c:numRef>
+              <c:f>Sheet1!$B$2:$B$5</c:f>
+              <c:numCache>
+                <c:formatCode>General</c:formatCode>
+                <c:ptCount val="4"/>
+                <c:pt idx="0">
+                  <c:v>4.3</c:v>
+                </c:pt>
+                <c:pt idx="1">
+                  <c:v>2.5</c:v>
+                </c:pt>
+                <c:pt idx="2">
+                  <c:v>3.5</c:v>
+                </c:pt>
+                <c:pt idx="3">
+                  <c:v>4.5</c:v>
+                </c:pt>
+              </c:numCache>
+            </c:numRef>
+          </c:val>
+          <c:extLst>
+            <c:ext xmlns:c16="http://schemas.microsoft.com/office/drawing/2014/chart" uri="{C3380CC4-5D6E-409C-BE32-E72D297353CC}">
+              <c16:uniqueId val="{00000000-5013-1D4B-9878-7F837C568E4F}"/>
+            </c:ext>
+          </c:extLst>
+        </c:ser>
+        <c:ser>
+          <c:idx val="1"/>
+          <c:order val="1"/>
+          <c:tx>
+            <c:strRef>
+              <c:f>Sheet1!$C$1</c:f>
+              <c:strCache>
+                <c:ptCount val="1"/>
+                <c:pt idx="0">
+                  <c:v>Series 2</c:v>
+                </c:pt>
+              </c:strCache>
+            </c:strRef>
+          </c:tx>
+          <c:spPr>
+            <a:solidFill>
+              <a:schemeClr val="accent2"/>
+            </a:solidFill>
+            <a:ln>
+              <a:noFill/>
+            </a:ln>
+            <a:effectLst/>
+          </c:spPr>
+          <c:invertIfNegative val="0"/>
+          <c:cat>
+            <c:strRef>
+              <c:f>Sheet1!$A$2:$A$5</c:f>
+              <c:strCache>
+                <c:ptCount val="4"/>
+                <c:pt idx="0">
+                  <c:v>Category 1</c:v>
+                </c:pt>
+                <c:pt idx="1">
+                  <c:v>Category 2</c:v>
+                </c:pt>
+                <c:pt idx="2">
+                  <c:v>Category 3</c:v>
+                </c:pt>
+                <c:pt idx="3">
+                  <c:v>Category 4</c:v>
+                </c:pt>
+              </c:strCache>
+            </c:strRef>
+          </c:cat>
+          <c:val>
+            <c:numRef>
+              <c:f>Sheet1!$C$2:$C$5</c:f>
+              <c:numCache>
+                <c:formatCode>General</c:formatCode>
+                <c:ptCount val="4"/>
+                <c:pt idx="0">
+                  <c:v>2.4</c:v>
+                </c:pt>
+                <c:pt idx="1">
+                  <c:v>4.4000000000000004</c:v>
+                </c:pt>
+                <c:pt idx="2">
+                  <c:v>1.8</c:v>
+                </c:pt>
+                <c:pt idx="3">
+                  <c:v>2.8</c:v>
+                </c:pt>
+              </c:numCache>
+            </c:numRef>
+          </c:val>
+          <c:extLst>
+            <c:ext xmlns:c16="http://schemas.microsoft.com/office/drawing/2014/chart" uri="{C3380CC4-5D6E-409C-BE32-E72D297353CC}">
+              <c16:uniqueId val="{00000001-5013-1D4B-9878-7F837C568E4F}"/>
+            </c:ext>
+          </c:extLst>
+        </c:ser>
+        <c:ser>
+          <c:idx val="2"/>
+          <c:order val="2"/>
+          <c:tx>
+            <c:strRef>
+              <c:f>Sheet1!$D$1</c:f>
+              <c:strCache>
+                <c:ptCount val="1"/>
+                <c:pt idx="0">
+                  <c:v>Series 3</c:v>
+                </c:pt>
+              </c:strCache>
+            </c:strRef>
+          </c:tx>
+          <c:spPr>
+            <a:solidFill>
+              <a:schemeClr val="accent3"/>
+            </a:solidFill>
+            <a:ln>
+              <a:noFill/>
+            </a:ln>
+            <a:effectLst/>
+          </c:spPr>
+          <c:invertIfNegative val="0"/>
+          <c:cat>
+            <c:strRef>
+              <c:f>Sheet1!$A$2:$A$5</c:f>
+              <c:strCache>
+                <c:ptCount val="4"/>
+                <c:pt idx="0">
+                  <c:v>Category 1</c:v>
+                </c:pt>
+                <c:pt idx="1">
+                  <c:v>Category 2</c:v>
+                </c:pt>
+                <c:pt idx="2">
+                  <c:v>Category 3</c:v>
+                </c:pt>
+                <c:pt idx="3">
+                  <c:v>Category 4</c:v>
+                </c:pt>
+              </c:strCache>
+            </c:strRef>
+          </c:cat>
+          <c:val>
+            <c:numRef>
+              <c:f>Sheet1!$D$2:$D$5</c:f>
+              <c:numCache>
+                <c:formatCode>General</c:formatCode>
+                <c:ptCount val="4"/>
+                <c:pt idx="0">
+                  <c:v>2</c:v>
+                </c:pt>
+                <c:pt idx="1">
+                  <c:v>2</c:v>
+                </c:pt>
+                <c:pt idx="2">
+                  <c:v>3</c:v>
+                </c:pt>
+                <c:pt idx="3">
+                  <c:v>5</c:v>
+                </c:pt>
+              </c:numCache>
+            </c:numRef>
+          </c:val>
+          <c:extLst>
+            <c:ext xmlns:c16="http://schemas.microsoft.com/office/drawing/2014/chart" uri="{C3380CC4-5D6E-409C-BE32-E72D297353CC}">
+              <c16:uniqueId val="{00000002-5013-1D4B-9878-7F837C568E4F}"/>
+            </c:ext>
+          </c:extLst>
+        </c:ser>
+        <c:dLbls>
+          <c:showLegendKey val="0"/>
+          <c:showVal val="0"/>
+          <c:showCatName val="0"/>
+          <c:showSerName val="0"/>
+          <c:showPercent val="0"/>
+          <c:showBubbleSize val="0"/>
+        </c:dLbls>
+        <c:gapWidth val="150"/>
+        <c:overlap val="100"/>
+        <c:axId val="721249679"/>
+        <c:axId val="396872256"/>
+      </c:barChart>
+      <c:catAx>
+        <c:axId val="721249679"/>
+        <c:scaling>
+          <c:orientation val="minMax"/>
+        </c:scaling>
+        <c:delete val="0"/>
+        <c:axPos val="b"/>
+        <c:numFmt formatCode="General" sourceLinked="1"/>
+        <c:majorTickMark val="none"/>
+        <c:minorTickMark val="none"/>
+        <c:tickLblPos val="nextTo"/>
+        <c:spPr>
+          <a:noFill/>
+          <a:ln w="9525" cap="flat" cmpd="sng" algn="ctr">
+            <a:solidFill>
+              <a:schemeClr val="tx1">
+                <a:lumMod val="15000"/>
+                <a:lumOff val="85000"/>
+              </a:schemeClr>
+            </a:solidFill>
+            <a:round/>
+          </a:ln>
+          <a:effectLst/>
+        </c:spPr>
+        <c:txPr>
+          <a:bodyPr rot="-60000000" spcFirstLastPara="1" vertOverflow="ellipsis" vert="horz" wrap="square" anchor="ctr" anchorCtr="1"/>
+          <a:lstStyle/>
+          <a:p>
+            <a:pPr>
+              <a:defRPr sz="1197" b="0" i="0" u="none" strike="noStrike" kern="1200" baseline="0">
+                <a:solidFill>
+                  <a:schemeClr val="tx1">
+                    <a:lumMod val="65000"/>
+                    <a:lumOff val="35000"/>
+                  </a:schemeClr>
+                </a:solidFill>
+                <a:latin typeface="+mn-lt"/>
+                <a:ea typeface="+mn-ea"/>
+                <a:cs typeface="+mn-cs"/>
+              </a:defRPr>
+            </a:pPr>
+            <a:endParaRPr lang="en-US"/>
+          </a:p>
+        </c:txPr>
+        <c:crossAx val="396872256"/>
+        <c:crosses val="autoZero"/>
+        <c:auto val="1"/>
+        <c:lblAlgn val="ctr"/>
+        <c:lblOffset val="100"/>
+        <c:noMultiLvlLbl val="0"/>
+      </c:catAx>
+      <c:valAx>
+        <c:axId val="396872256"/>
+        <c:scaling>
+          <c:orientation val="minMax"/>
+        </c:scaling>
+        <c:delete val="0"/>
+        <c:axPos val="l"/>
+        <c:majorGridlines>
+          <c:spPr>
+            <a:ln w="9525" cap="flat" cmpd="sng" algn="ctr">
+              <a:solidFill>
+                <a:schemeClr val="tx1">
+                  <a:lumMod val="15000"/>
+                  <a:lumOff val="85000"/>
+                </a:schemeClr>
+              </a:solidFill>
+              <a:round/>
+            </a:ln>
+            <a:effectLst/>
+          </c:spPr>
+        </c:majorGridlines>
+        <c:numFmt formatCode="General" sourceLinked="1"/>
+        <c:majorTickMark val="none"/>
+        <c:minorTickMark val="none"/>
+        <c:tickLblPos val="nextTo"/>
+        <c:spPr>
+          <a:noFill/>
+          <a:ln>
+            <a:noFill/>
+          </a:ln>
+          <a:effectLst/>
+        </c:spPr>
+        <c:txPr>
+          <a:bodyPr rot="-60000000" spcFirstLastPara="1" vertOverflow="ellipsis" vert="horz" wrap="square" anchor="ctr" anchorCtr="1"/>
+          <a:lstStyle/>
+          <a:p>
+            <a:pPr>
+              <a:defRPr sz="1197" b="0" i="0" u="none" strike="noStrike" kern="1200" baseline="0">
+                <a:solidFill>
+                  <a:schemeClr val="tx1">
+                    <a:lumMod val="65000"/>
+                    <a:lumOff val="35000"/>
+                  </a:schemeClr>
+                </a:solidFill>
+                <a:latin typeface="+mn-lt"/>
+                <a:ea typeface="+mn-ea"/>
+                <a:cs typeface="+mn-cs"/>
+              </a:defRPr>
+            </a:pPr>
+            <a:endParaRPr lang="en-US"/>
+          </a:p>
+        </c:txPr>
+        <c:crossAx val="721249679"/>
+        <c:crosses val="autoZero"/>
+        <c:crossBetween val="between"/>
+      </c:valAx>
+      <c:spPr>
+        <a:noFill/>
+        <a:ln>
+          <a:noFill/>
+        </a:ln>
+        <a:effectLst/>
+      </c:spPr>
+    </c:plotArea>
+    <c:legend>
+      <c:legendPos val="b"/>
+      <c:overlay val="0"/>
+      <c:spPr>
+        <a:noFill/>
+        <a:ln>
+          <a:noFill/>
+        </a:ln>
+        <a:effectLst/>
+      </c:spPr>
+      <c:txPr>
+        <a:bodyPr rot="0" spcFirstLastPara="1" vertOverflow="ellipsis" vert="horz" wrap="square" anchor="ctr" anchorCtr="1"/>
+        <a:lstStyle/>
+        <a:p>
+          <a:pPr>
+            <a:defRPr sz="1197" b="0" i="0" u="none" strike="noStrike" kern="1200" baseline="0">
+              <a:solidFill>
+                <a:schemeClr val="tx1">
+                  <a:lumMod val="65000"/>
+                  <a:lumOff val="35000"/>
+                </a:schemeClr>
+              </a:solidFill>
+              <a:latin typeface="+mn-lt"/>
+              <a:ea typeface="+mn-ea"/>
+              <a:cs typeface="+mn-cs"/>
+            </a:defRPr>
+          </a:pPr>
+          <a:endParaRPr lang="en-US"/>
+        </a:p>
+      </c:txPr>
+    </c:legend>
+    <c:plotVisOnly val="1"/>
+    <c:dispBlanksAs val="gap"/>
+    <c:extLst>
+      <c:ext xmlns:c16r3="http://schemas.microsoft.com/office/drawing/2017/03/chart" uri="{56B9EC1D-385E-4148-901F-78D8002777C0}">
+        <c16r3:dataDisplayOptions16>
+          <c16r3:dispNaAsBlank val="1"/>
+        </c16r3:dataDisplayOptions16>
+      </c:ext>
+    </c:extLst>
+    <c:showDLblsOverMax val="0"/>
+  </c:chart>
+  <c:spPr>
+    <a:noFill/>
+    <a:ln>
+      <a:noFill/>
+    </a:ln>
+    <a:effectLst/>
+  </c:spPr>
+  <c:txPr>
+    <a:bodyPr/>
+    <a:lstStyle/>
+    <a:p>
+      <a:pPr>
+        <a:defRPr/>
+      </a:pPr>
+      <a:endParaRPr lang="en-US"/>
+    </a:p>
+  </c:txPr>
+  <c:externalData r:id="rId3">
+    <c:autoUpdate val="0"/>
+  </c:externalData>
+</c:chartSpace>
+</file>
+
+<file path=ppt/charts/colors1.xml><?xml version="1.0" encoding="utf-8"?>
+<cs:colorStyle xmlns:cs="http://schemas.microsoft.com/office/drawing/2012/chartStyle" xmlns:a="http://schemas.openxmlformats.org/drawingml/2006/main" meth="cycle" id="10">
+  <a:schemeClr val="accent1"/>
+  <a:schemeClr val="accent2"/>
+  <a:schemeClr val="accent3"/>
+  <a:schemeClr val="accent4"/>
+  <a:schemeClr val="accent5"/>
+  <a:schemeClr val="accent6"/>
+  <cs:variation/>
+  <cs:variation>
+    <a:lumMod val="60000"/>
+  </cs:variation>
+  <cs:variation>
+    <a:lumMod val="80000"/>
+    <a:lumOff val="20000"/>
+  </cs:variation>
+  <cs:variation>
+    <a:lumMod val="80000"/>
+  </cs:variation>
+  <cs:variation>
+    <a:lumMod val="60000"/>
+    <a:lumOff val="40000"/>
+  </cs:variation>
+  <cs:variation>
+    <a:lumMod val="50000"/>
+  </cs:variation>
+  <cs:variation>
+    <a:lumMod val="70000"/>
+    <a:lumOff val="30000"/>
+  </cs:variation>
+  <cs:variation>
+    <a:lumMod val="70000"/>
+  </cs:variation>
+  <cs:variation>
+    <a:lumMod val="50000"/>
+    <a:lumOff val="50000"/>
+  </cs:variation>
+</cs:colorStyle>
+</file>
+
+<file path=ppt/charts/colors2.xml><?xml version="1.0" encoding="utf-8"?>
+<cs:colorStyle xmlns:cs="http://schemas.microsoft.com/office/drawing/2012/chartStyle" xmlns:a="http://schemas.openxmlformats.org/drawingml/2006/main" meth="cycle" id="10">
+  <a:schemeClr val="accent1"/>
+  <a:schemeClr val="accent2"/>
+  <a:schemeClr val="accent3"/>
+  <a:schemeClr val="accent4"/>
+  <a:schemeClr val="accent5"/>
+  <a:schemeClr val="accent6"/>
+  <cs:variation/>
+  <cs:variation>
+    <a:lumMod val="60000"/>
+  </cs:variation>
+  <cs:variation>
+    <a:lumMod val="80000"/>
+    <a:lumOff val="20000"/>
+  </cs:variation>
+  <cs:variation>
+    <a:lumMod val="80000"/>
+  </cs:variation>
+  <cs:variation>
+    <a:lumMod val="60000"/>
+    <a:lumOff val="40000"/>
+  </cs:variation>
+  <cs:variation>
+    <a:lumMod val="50000"/>
+  </cs:variation>
+  <cs:variation>
+    <a:lumMod val="70000"/>
+    <a:lumOff val="30000"/>
+  </cs:variation>
+  <cs:variation>
+    <a:lumMod val="70000"/>
+  </cs:variation>
+  <cs:variation>
+    <a:lumMod val="50000"/>
+    <a:lumOff val="50000"/>
+  </cs:variation>
+</cs:colorStyle>
+</file>
+
+<file path=ppt/charts/style1.xml><?xml version="1.0" encoding="utf-8"?>
+<cs:chartStyle xmlns:cs="http://schemas.microsoft.com/office/drawing/2012/chartStyle" xmlns:a="http://schemas.openxmlformats.org/drawingml/2006/main" id="297">
+  <cs:axisTitle>
+    <cs:lnRef idx="0"/>
+    <cs:fillRef idx="0"/>
+    <cs:effectRef idx="0"/>
+    <cs:fontRef idx="minor">
+      <a:schemeClr val="tx1">
+        <a:lumMod val="65000"/>
+        <a:lumOff val="35000"/>
+      </a:schemeClr>
+    </cs:fontRef>
+    <cs:defRPr sz="1330" kern="1200"/>
+  </cs:axisTitle>
+  <cs:categoryAxis>
+    <cs:lnRef idx="0"/>
+    <cs:fillRef idx="0"/>
+    <cs:effectRef idx="0"/>
+    <cs:fontRef idx="minor">
+      <a:schemeClr val="tx1">
+        <a:lumMod val="65000"/>
+        <a:lumOff val="35000"/>
+      </a:schemeClr>
+    </cs:fontRef>
+    <cs:spPr>
+      <a:ln w="9525" cap="flat" cmpd="sng" algn="ctr">
+        <a:solidFill>
+          <a:schemeClr val="tx1">
+            <a:lumMod val="15000"/>
+            <a:lumOff val="85000"/>
+          </a:schemeClr>
+        </a:solidFill>
+        <a:round/>
+      </a:ln>
+    </cs:spPr>
+    <cs:defRPr sz="1197" kern="1200"/>
+  </cs:categoryAxis>
+  <cs:chartArea mods="allowNoFillOverride allowNoLineOverride">
+    <cs:lnRef idx="0"/>
+    <cs:fillRef idx="0"/>
+    <cs:effectRef idx="0"/>
+    <cs:fontRef idx="minor">
+      <a:schemeClr val="tx1"/>
+    </cs:fontRef>
+    <cs:spPr>
+      <a:solidFill>
+        <a:schemeClr val="bg1"/>
+      </a:solidFill>
+      <a:ln w="9525" cap="flat" cmpd="sng" algn="ctr">
+        <a:solidFill>
+          <a:schemeClr val="tx1">
+            <a:lumMod val="15000"/>
+            <a:lumOff val="85000"/>
+          </a:schemeClr>
+        </a:solidFill>
+        <a:round/>
+      </a:ln>
+    </cs:spPr>
+    <cs:defRPr sz="1330" kern="1200"/>
+  </cs:chartArea>
+  <cs:dataLabel>
+    <cs:lnRef idx="0"/>
+    <cs:fillRef idx="0"/>
+    <cs:effectRef idx="0"/>
+    <cs:fontRef idx="minor">
+      <a:schemeClr val="tx1">
+        <a:lumMod val="75000"/>
+        <a:lumOff val="25000"/>
+      </a:schemeClr>
+    </cs:fontRef>
+    <cs:defRPr sz="1197" kern="1200"/>
+  </cs:dataLabel>
+  <cs:dataLabelCallout>
+    <cs:lnRef idx="0"/>
+    <cs:fillRef idx="0"/>
+    <cs:effectRef idx="0"/>
+    <cs:fontRef idx="minor">
+      <a:schemeClr val="dk1">
+        <a:lumMod val="65000"/>
+        <a:lumOff val="35000"/>
+      </a:schemeClr>
+    </cs:fontRef>
+    <cs:spPr>
+      <a:solidFill>
+        <a:schemeClr val="lt1"/>
+      </a:solidFill>
+      <a:ln>
+        <a:solidFill>
+          <a:schemeClr val="dk1">
+            <a:lumMod val="25000"/>
+            <a:lumOff val="75000"/>
+          </a:schemeClr>
+        </a:solidFill>
+      </a:ln>
+    </cs:spPr>
+    <cs:defRPr sz="1197" kern="1200"/>
+    <cs:bodyPr rot="0" spcFirstLastPara="1" vertOverflow="clip" horzOverflow="clip" vert="horz" wrap="square" lIns="36576" tIns="18288" rIns="36576" bIns="18288" anchor="ctr" anchorCtr="1">
+      <a:spAutoFit/>
+    </cs:bodyPr>
+  </cs:dataLabelCallout>
+  <cs:dataPoint>
+    <cs:lnRef idx="0"/>
+    <cs:fillRef idx="1">
+      <cs:styleClr val="auto"/>
+    </cs:fillRef>
+    <cs:effectRef idx="0"/>
+    <cs:fontRef idx="minor">
+      <a:schemeClr val="tx1"/>
+    </cs:fontRef>
+  </cs:dataPoint>
+  <cs:dataPoint3D>
+    <cs:lnRef idx="0"/>
+    <cs:fillRef idx="1">
+      <cs:styleClr val="auto"/>
+    </cs:fillRef>
+    <cs:effectRef idx="0"/>
+    <cs:fontRef idx="minor">
+      <a:schemeClr val="tx1"/>
+    </cs:fontRef>
+  </cs:dataPoint3D>
+  <cs:dataPointLine>
+    <cs:lnRef idx="0">
+      <cs:styleClr val="auto"/>
+    </cs:lnRef>
+    <cs:fillRef idx="1"/>
+    <cs:effectRef idx="0"/>
+    <cs:fontRef idx="minor">
+      <a:schemeClr val="tx1"/>
+    </cs:fontRef>
+    <cs:spPr>
+      <a:ln w="28575" cap="rnd">
+        <a:solidFill>
+          <a:schemeClr val="phClr"/>
+        </a:solidFill>
+        <a:round/>
+      </a:ln>
+    </cs:spPr>
+  </cs:dataPointLine>
+  <cs:dataPointMarker>
+    <cs:lnRef idx="0">
+      <cs:styleClr val="auto"/>
+    </cs:lnRef>
+    <cs:fillRef idx="1">
+      <cs:styleClr val="auto"/>
+    </cs:fillRef>
+    <cs:effectRef idx="0"/>
+    <cs:fontRef idx="minor">
+      <a:schemeClr val="tx1"/>
+    </cs:fontRef>
+    <cs:spPr>
+      <a:ln w="9525">
+        <a:solidFill>
+          <a:schemeClr val="phClr"/>
+        </a:solidFill>
+      </a:ln>
+    </cs:spPr>
+  </cs:dataPointMarker>
+  <cs:dataPointMarkerLayout symbol="circle" size="5"/>
+  <cs:dataPointWireframe>
+    <cs:lnRef idx="0">
+      <cs:styleClr val="auto"/>
+    </cs:lnRef>
+    <cs:fillRef idx="1"/>
+    <cs:effectRef idx="0"/>
+    <cs:fontRef idx="minor">
+      <a:schemeClr val="tx1"/>
+    </cs:fontRef>
+    <cs:spPr>
+      <a:ln w="9525" cap="rnd">
+        <a:solidFill>
+          <a:schemeClr val="phClr"/>
+        </a:solidFill>
+        <a:round/>
+      </a:ln>
+    </cs:spPr>
+  </cs:dataPointWireframe>
+  <cs:dataTable>
+    <cs:lnRef idx="0"/>
+    <cs:fillRef idx="0"/>
+    <cs:effectRef idx="0"/>
+    <cs:fontRef idx="minor">
+      <a:schemeClr val="tx1">
+        <a:lumMod val="65000"/>
+        <a:lumOff val="35000"/>
+      </a:schemeClr>
+    </cs:fontRef>
+    <cs:spPr>
+      <a:noFill/>
+      <a:ln w="9525" cap="flat" cmpd="sng" algn="ctr">
+        <a:solidFill>
+          <a:schemeClr val="tx1">
+            <a:lumMod val="15000"/>
+            <a:lumOff val="85000"/>
+          </a:schemeClr>
+        </a:solidFill>
+        <a:round/>
+      </a:ln>
+    </cs:spPr>
+    <cs:defRPr sz="1197" kern="1200"/>
+  </cs:dataTable>
+  <cs:downBar>
+    <cs:lnRef idx="0"/>
+    <cs:fillRef idx="0"/>
+    <cs:effectRef idx="0"/>
+    <cs:fontRef idx="minor">
+      <a:schemeClr val="tx1"/>
+    </cs:fontRef>
+    <cs:spPr>
+      <a:solidFill>
+        <a:schemeClr val="dk1">
+          <a:lumMod val="75000"/>
+          <a:lumOff val="25000"/>
+        </a:schemeClr>
+      </a:solidFill>
+      <a:ln w="9525" cap="flat" cmpd="sng" algn="ctr">
+        <a:solidFill>
+          <a:schemeClr val="tx1">
+            <a:lumMod val="65000"/>
+            <a:lumOff val="35000"/>
+          </a:schemeClr>
+        </a:solidFill>
+        <a:round/>
+      </a:ln>
+    </cs:spPr>
+  </cs:downBar>
+  <cs:dropLine>
+    <cs:lnRef idx="0"/>
+    <cs:fillRef idx="0"/>
+    <cs:effectRef idx="0"/>
+    <cs:fontRef idx="minor">
+      <a:schemeClr val="tx1"/>
+    </cs:fontRef>
+    <cs:spPr>
+      <a:ln w="9525" cap="flat" cmpd="sng" algn="ctr">
+        <a:solidFill>
+          <a:schemeClr val="tx1">
+            <a:lumMod val="35000"/>
+            <a:lumOff val="65000"/>
+          </a:schemeClr>
+        </a:solidFill>
+        <a:round/>
+      </a:ln>
+    </cs:spPr>
+  </cs:dropLine>
+  <cs:errorBar>
+    <cs:lnRef idx="0"/>
+    <cs:fillRef idx="0"/>
+    <cs:effectRef idx="0"/>
+    <cs:fontRef idx="minor">
+      <a:schemeClr val="tx1"/>
+    </cs:fontRef>
+    <cs:spPr>
+      <a:ln w="9525" cap="flat" cmpd="sng" algn="ctr">
+        <a:solidFill>
+          <a:schemeClr val="tx1">
+            <a:lumMod val="65000"/>
+            <a:lumOff val="35000"/>
+          </a:schemeClr>
+        </a:solidFill>
+        <a:round/>
+      </a:ln>
+    </cs:spPr>
+  </cs:errorBar>
+  <cs:floor>
+    <cs:lnRef idx="0"/>
+    <cs:fillRef idx="0"/>
+    <cs:effectRef idx="0"/>
+    <cs:fontRef idx="minor">
+      <a:schemeClr val="tx1"/>
+    </cs:fontRef>
+    <cs:spPr>
+      <a:noFill/>
+      <a:ln>
+        <a:noFill/>
+      </a:ln>
+    </cs:spPr>
+  </cs:floor>
+  <cs:gridlineMajor>
+    <cs:lnRef idx="0"/>
+    <cs:fillRef idx="0"/>
+    <cs:effectRef idx="0"/>
+    <cs:fontRef idx="minor">
+      <a:schemeClr val="tx1"/>
+    </cs:fontRef>
+    <cs:spPr>
+      <a:ln w="9525" cap="flat" cmpd="sng" algn="ctr">
+        <a:solidFill>
+          <a:schemeClr val="tx1">
+            <a:lumMod val="15000"/>
+            <a:lumOff val="85000"/>
+          </a:schemeClr>
+        </a:solidFill>
+        <a:round/>
+      </a:ln>
+    </cs:spPr>
+  </cs:gridlineMajor>
+  <cs:gridlineMinor>
+    <cs:lnRef idx="0"/>
+    <cs:fillRef idx="0"/>
+    <cs:effectRef idx="0"/>
+    <cs:fontRef idx="minor">
+      <a:schemeClr val="tx1"/>
+    </cs:fontRef>
+    <cs:spPr>
+      <a:ln w="9525" cap="flat" cmpd="sng" algn="ctr">
+        <a:solidFill>
+          <a:schemeClr val="tx1">
+            <a:lumMod val="5000"/>
+            <a:lumOff val="95000"/>
+          </a:schemeClr>
+        </a:solidFill>
+        <a:round/>
+      </a:ln>
+    </cs:spPr>
+  </cs:gridlineMinor>
+  <cs:hiLoLine>
+    <cs:lnRef idx="0"/>
+    <cs:fillRef idx="0"/>
+    <cs:effectRef idx="0"/>
+    <cs:fontRef idx="minor">
+      <a:schemeClr val="tx1"/>
+    </cs:fontRef>
+    <cs:spPr>
+      <a:ln w="9525" cap="flat" cmpd="sng" algn="ctr">
+        <a:solidFill>
+          <a:schemeClr val="tx1">
+            <a:lumMod val="50000"/>
+            <a:lumOff val="50000"/>
+          </a:schemeClr>
+        </a:solidFill>
+        <a:round/>
+      </a:ln>
+    </cs:spPr>
+  </cs:hiLoLine>
+  <cs:leaderLine>
+    <cs:lnRef idx="0"/>
+    <cs:fillRef idx="0"/>
+    <cs:effectRef idx="0"/>
+    <cs:fontRef idx="minor">
+      <a:schemeClr val="tx1"/>
+    </cs:fontRef>
+    <cs:spPr>
+      <a:ln w="9525" cap="flat" cmpd="sng" algn="ctr">
+        <a:solidFill>
+          <a:schemeClr val="tx1">
+            <a:lumMod val="35000"/>
+            <a:lumOff val="65000"/>
+          </a:schemeClr>
+        </a:solidFill>
+        <a:round/>
+      </a:ln>
+    </cs:spPr>
+  </cs:leaderLine>
+  <cs:legend>
+    <cs:lnRef idx="0"/>
+    <cs:fillRef idx="0"/>
+    <cs:effectRef idx="0"/>
+    <cs:fontRef idx="minor">
+      <a:schemeClr val="tx1">
+        <a:lumMod val="65000"/>
+        <a:lumOff val="35000"/>
+      </a:schemeClr>
+    </cs:fontRef>
+    <cs:defRPr sz="1197" kern="1200"/>
+  </cs:legend>
+  <cs:plotArea mods="allowNoFillOverride allowNoLineOverride">
+    <cs:lnRef idx="0"/>
+    <cs:fillRef idx="0"/>
+    <cs:effectRef idx="0"/>
+    <cs:fontRef idx="minor">
+      <a:schemeClr val="tx1"/>
+    </cs:fontRef>
+  </cs:plotArea>
+  <cs:plotArea3D mods="allowNoFillOverride allowNoLineOverride">
+    <cs:lnRef idx="0"/>
+    <cs:fillRef idx="0"/>
+    <cs:effectRef idx="0"/>
+    <cs:fontRef idx="minor">
+      <a:schemeClr val="tx1"/>
+    </cs:fontRef>
+  </cs:plotArea3D>
+  <cs:seriesAxis>
+    <cs:lnRef idx="0"/>
+    <cs:fillRef idx="0"/>
+    <cs:effectRef idx="0"/>
+    <cs:fontRef idx="minor">
+      <a:schemeClr val="tx1">
+        <a:lumMod val="65000"/>
+        <a:lumOff val="35000"/>
+      </a:schemeClr>
+    </cs:fontRef>
+    <cs:defRPr sz="1197" kern="1200"/>
+  </cs:seriesAxis>
+  <cs:seriesLine>
+    <cs:lnRef idx="0"/>
+    <cs:fillRef idx="0"/>
+    <cs:effectRef idx="0"/>
+    <cs:fontRef idx="minor">
+      <a:schemeClr val="tx1"/>
+    </cs:fontRef>
+    <cs:spPr>
+      <a:ln w="9525" cap="flat" cmpd="sng" algn="ctr">
+        <a:solidFill>
+          <a:schemeClr val="tx1">
+            <a:lumMod val="35000"/>
+            <a:lumOff val="65000"/>
+          </a:schemeClr>
+        </a:solidFill>
+        <a:round/>
+      </a:ln>
+    </cs:spPr>
+  </cs:seriesLine>
+  <cs:title>
+    <cs:lnRef idx="0"/>
+    <cs:fillRef idx="0"/>
+    <cs:effectRef idx="0"/>
+    <cs:fontRef idx="minor">
+      <a:schemeClr val="tx1">
+        <a:lumMod val="65000"/>
+        <a:lumOff val="35000"/>
+      </a:schemeClr>
+    </cs:fontRef>
+    <cs:defRPr sz="1862" b="0" kern="1200" spc="0" baseline="0"/>
+  </cs:title>
+  <cs:trendline>
+    <cs:lnRef idx="0">
+      <cs:styleClr val="auto"/>
+    </cs:lnRef>
+    <cs:fillRef idx="0"/>
+    <cs:effectRef idx="0"/>
+    <cs:fontRef idx="minor">
+      <a:schemeClr val="tx1"/>
+    </cs:fontRef>
+    <cs:spPr>
+      <a:ln w="19050" cap="rnd">
+        <a:solidFill>
+          <a:schemeClr val="phClr"/>
+        </a:solidFill>
+        <a:prstDash val="sysDot"/>
+      </a:ln>
+    </cs:spPr>
+  </cs:trendline>
+  <cs:trendlineLabel>
+    <cs:lnRef idx="0"/>
+    <cs:fillRef idx="0"/>
+    <cs:effectRef idx="0"/>
+    <cs:fontRef idx="minor">
+      <a:schemeClr val="tx1">
+        <a:lumMod val="65000"/>
+        <a:lumOff val="35000"/>
+      </a:schemeClr>
+    </cs:fontRef>
+    <cs:defRPr sz="1197" kern="1200"/>
+  </cs:trendlineLabel>
+  <cs:upBar>
+    <cs:lnRef idx="0"/>
+    <cs:fillRef idx="0"/>
+    <cs:effectRef idx="0"/>
+    <cs:fontRef idx="minor">
+      <a:schemeClr val="tx1"/>
+    </cs:fontRef>
+    <cs:spPr>
+      <a:solidFill>
+        <a:schemeClr val="lt1"/>
+      </a:solidFill>
+      <a:ln w="9525" cap="flat" cmpd="sng" algn="ctr">
+        <a:solidFill>
+          <a:schemeClr val="tx1">
+            <a:lumMod val="65000"/>
+            <a:lumOff val="35000"/>
+          </a:schemeClr>
+        </a:solidFill>
+        <a:round/>
+      </a:ln>
+    </cs:spPr>
+  </cs:upBar>
+  <cs:valueAxis>
+    <cs:lnRef idx="0"/>
+    <cs:fillRef idx="0"/>
+    <cs:effectRef idx="0"/>
+    <cs:fontRef idx="minor">
+      <a:schemeClr val="tx1">
+        <a:lumMod val="65000"/>
+        <a:lumOff val="35000"/>
+      </a:schemeClr>
+    </cs:fontRef>
+    <cs:defRPr sz="1197" kern="1200"/>
+  </cs:valueAxis>
+  <cs:wall>
+    <cs:lnRef idx="0"/>
+    <cs:fillRef idx="0"/>
+    <cs:effectRef idx="0"/>
+    <cs:fontRef idx="minor">
+      <a:schemeClr val="tx1"/>
+    </cs:fontRef>
+    <cs:spPr>
+      <a:noFill/>
+      <a:ln>
+        <a:noFill/>
+      </a:ln>
+    </cs:spPr>
+  </cs:wall>
+</cs:chartStyle>
+</file>
+
+<file path=ppt/charts/style2.xml><?xml version="1.0" encoding="utf-8"?>
+<cs:chartStyle xmlns:cs="http://schemas.microsoft.com/office/drawing/2012/chartStyle" xmlns:a="http://schemas.openxmlformats.org/drawingml/2006/main" id="297">
+  <cs:axisTitle>
+    <cs:lnRef idx="0"/>
+    <cs:fillRef idx="0"/>
+    <cs:effectRef idx="0"/>
+    <cs:fontRef idx="minor">
+      <a:schemeClr val="tx1">
+        <a:lumMod val="65000"/>
+        <a:lumOff val="35000"/>
+      </a:schemeClr>
+    </cs:fontRef>
+    <cs:defRPr sz="1330" kern="1200"/>
+  </cs:axisTitle>
+  <cs:categoryAxis>
+    <cs:lnRef idx="0"/>
+    <cs:fillRef idx="0"/>
+    <cs:effectRef idx="0"/>
+    <cs:fontRef idx="minor">
+      <a:schemeClr val="tx1">
+        <a:lumMod val="65000"/>
+        <a:lumOff val="35000"/>
+      </a:schemeClr>
+    </cs:fontRef>
+    <cs:spPr>
+      <a:ln w="9525" cap="flat" cmpd="sng" algn="ctr">
+        <a:solidFill>
+          <a:schemeClr val="tx1">
+            <a:lumMod val="15000"/>
+            <a:lumOff val="85000"/>
+          </a:schemeClr>
+        </a:solidFill>
+        <a:round/>
+      </a:ln>
+    </cs:spPr>
+    <cs:defRPr sz="1197" kern="1200"/>
+  </cs:categoryAxis>
+  <cs:chartArea mods="allowNoFillOverride allowNoLineOverride">
+    <cs:lnRef idx="0"/>
+    <cs:fillRef idx="0"/>
+    <cs:effectRef idx="0"/>
+    <cs:fontRef idx="minor">
+      <a:schemeClr val="tx1"/>
+    </cs:fontRef>
+    <cs:spPr>
+      <a:solidFill>
+        <a:schemeClr val="bg1"/>
+      </a:solidFill>
+      <a:ln w="9525" cap="flat" cmpd="sng" algn="ctr">
+        <a:solidFill>
+          <a:schemeClr val="tx1">
+            <a:lumMod val="15000"/>
+            <a:lumOff val="85000"/>
+          </a:schemeClr>
+        </a:solidFill>
+        <a:round/>
+      </a:ln>
+    </cs:spPr>
+    <cs:defRPr sz="1330" kern="1200"/>
+  </cs:chartArea>
+  <cs:dataLabel>
+    <cs:lnRef idx="0"/>
+    <cs:fillRef idx="0"/>
+    <cs:effectRef idx="0"/>
+    <cs:fontRef idx="minor">
+      <a:schemeClr val="tx1">
+        <a:lumMod val="75000"/>
+        <a:lumOff val="25000"/>
+      </a:schemeClr>
+    </cs:fontRef>
+    <cs:defRPr sz="1197" kern="1200"/>
+  </cs:dataLabel>
+  <cs:dataLabelCallout>
+    <cs:lnRef idx="0"/>
+    <cs:fillRef idx="0"/>
+    <cs:effectRef idx="0"/>
+    <cs:fontRef idx="minor">
+      <a:schemeClr val="dk1">
+        <a:lumMod val="65000"/>
+        <a:lumOff val="35000"/>
+      </a:schemeClr>
+    </cs:fontRef>
+    <cs:spPr>
+      <a:solidFill>
+        <a:schemeClr val="lt1"/>
+      </a:solidFill>
+      <a:ln>
+        <a:solidFill>
+          <a:schemeClr val="dk1">
+            <a:lumMod val="25000"/>
+            <a:lumOff val="75000"/>
+          </a:schemeClr>
+        </a:solidFill>
+      </a:ln>
+    </cs:spPr>
+    <cs:defRPr sz="1197" kern="1200"/>
+    <cs:bodyPr rot="0" spcFirstLastPara="1" vertOverflow="clip" horzOverflow="clip" vert="horz" wrap="square" lIns="36576" tIns="18288" rIns="36576" bIns="18288" anchor="ctr" anchorCtr="1">
+      <a:spAutoFit/>
+    </cs:bodyPr>
+  </cs:dataLabelCallout>
+  <cs:dataPoint>
+    <cs:lnRef idx="0"/>
+    <cs:fillRef idx="1">
+      <cs:styleClr val="auto"/>
+    </cs:fillRef>
+    <cs:effectRef idx="0"/>
+    <cs:fontRef idx="minor">
+      <a:schemeClr val="tx1"/>
+    </cs:fontRef>
+  </cs:dataPoint>
+  <cs:dataPoint3D>
+    <cs:lnRef idx="0"/>
+    <cs:fillRef idx="1">
+      <cs:styleClr val="auto"/>
+    </cs:fillRef>
+    <cs:effectRef idx="0"/>
+    <cs:fontRef idx="minor">
+      <a:schemeClr val="tx1"/>
+    </cs:fontRef>
+  </cs:dataPoint3D>
+  <cs:dataPointLine>
+    <cs:lnRef idx="0">
+      <cs:styleClr val="auto"/>
+    </cs:lnRef>
+    <cs:fillRef idx="1"/>
+    <cs:effectRef idx="0"/>
+    <cs:fontRef idx="minor">
+      <a:schemeClr val="tx1"/>
+    </cs:fontRef>
+    <cs:spPr>
+      <a:ln w="28575" cap="rnd">
+        <a:solidFill>
+          <a:schemeClr val="phClr"/>
+        </a:solidFill>
+        <a:round/>
+      </a:ln>
+    </cs:spPr>
+  </cs:dataPointLine>
+  <cs:dataPointMarker>
+    <cs:lnRef idx="0">
+      <cs:styleClr val="auto"/>
+    </cs:lnRef>
+    <cs:fillRef idx="1">
+      <cs:styleClr val="auto"/>
+    </cs:fillRef>
+    <cs:effectRef idx="0"/>
+    <cs:fontRef idx="minor">
+      <a:schemeClr val="tx1"/>
+    </cs:fontRef>
+    <cs:spPr>
+      <a:ln w="9525">
+        <a:solidFill>
+          <a:schemeClr val="phClr"/>
+        </a:solidFill>
+      </a:ln>
+    </cs:spPr>
+  </cs:dataPointMarker>
+  <cs:dataPointMarkerLayout symbol="circle" size="5"/>
+  <cs:dataPointWireframe>
+    <cs:lnRef idx="0">
+      <cs:styleClr val="auto"/>
+    </cs:lnRef>
+    <cs:fillRef idx="1"/>
+    <cs:effectRef idx="0"/>
+    <cs:fontRef idx="minor">
+      <a:schemeClr val="tx1"/>
+    </cs:fontRef>
+    <cs:spPr>
+      <a:ln w="9525" cap="rnd">
+        <a:solidFill>
+          <a:schemeClr val="phClr"/>
+        </a:solidFill>
+        <a:round/>
+      </a:ln>
+    </cs:spPr>
+  </cs:dataPointWireframe>
+  <cs:dataTable>
+    <cs:lnRef idx="0"/>
+    <cs:fillRef idx="0"/>
+    <cs:effectRef idx="0"/>
+    <cs:fontRef idx="minor">
+      <a:schemeClr val="tx1">
+        <a:lumMod val="65000"/>
+        <a:lumOff val="35000"/>
+      </a:schemeClr>
+    </cs:fontRef>
+    <cs:spPr>
+      <a:noFill/>
+      <a:ln w="9525" cap="flat" cmpd="sng" algn="ctr">
+        <a:solidFill>
+          <a:schemeClr val="tx1">
+            <a:lumMod val="15000"/>
+            <a:lumOff val="85000"/>
+          </a:schemeClr>
+        </a:solidFill>
+        <a:round/>
+      </a:ln>
+    </cs:spPr>
+    <cs:defRPr sz="1197" kern="1200"/>
+  </cs:dataTable>
+  <cs:downBar>
+    <cs:lnRef idx="0"/>
+    <cs:fillRef idx="0"/>
+    <cs:effectRef idx="0"/>
+    <cs:fontRef idx="minor">
+      <a:schemeClr val="tx1"/>
+    </cs:fontRef>
+    <cs:spPr>
+      <a:solidFill>
+        <a:schemeClr val="dk1">
+          <a:lumMod val="75000"/>
+          <a:lumOff val="25000"/>
+        </a:schemeClr>
+      </a:solidFill>
+      <a:ln w="9525" cap="flat" cmpd="sng" algn="ctr">
+        <a:solidFill>
+          <a:schemeClr val="tx1">
+            <a:lumMod val="65000"/>
+            <a:lumOff val="35000"/>
+          </a:schemeClr>
+        </a:solidFill>
+        <a:round/>
+      </a:ln>
+    </cs:spPr>
+  </cs:downBar>
+  <cs:dropLine>
+    <cs:lnRef idx="0"/>
+    <cs:fillRef idx="0"/>
+    <cs:effectRef idx="0"/>
+    <cs:fontRef idx="minor">
+      <a:schemeClr val="tx1"/>
+    </cs:fontRef>
+    <cs:spPr>
+      <a:ln w="9525" cap="flat" cmpd="sng" algn="ctr">
+        <a:solidFill>
+          <a:schemeClr val="tx1">
+            <a:lumMod val="35000"/>
+            <a:lumOff val="65000"/>
+          </a:schemeClr>
+        </a:solidFill>
+        <a:round/>
+      </a:ln>
+    </cs:spPr>
+  </cs:dropLine>
+  <cs:errorBar>
+    <cs:lnRef idx="0"/>
+    <cs:fillRef idx="0"/>
+    <cs:effectRef idx="0"/>
+    <cs:fontRef idx="minor">
+      <a:schemeClr val="tx1"/>
+    </cs:fontRef>
+    <cs:spPr>
+      <a:ln w="9525" cap="flat" cmpd="sng" algn="ctr">
+        <a:solidFill>
+          <a:schemeClr val="tx1">
+            <a:lumMod val="65000"/>
+            <a:lumOff val="35000"/>
+          </a:schemeClr>
+        </a:solidFill>
+        <a:round/>
+      </a:ln>
+    </cs:spPr>
+  </cs:errorBar>
+  <cs:floor>
+    <cs:lnRef idx="0"/>
+    <cs:fillRef idx="0"/>
+    <cs:effectRef idx="0"/>
+    <cs:fontRef idx="minor">
+      <a:schemeClr val="tx1"/>
+    </cs:fontRef>
+    <cs:spPr>
+      <a:noFill/>
+      <a:ln>
+        <a:noFill/>
+      </a:ln>
+    </cs:spPr>
+  </cs:floor>
+  <cs:gridlineMajor>
+    <cs:lnRef idx="0"/>
+    <cs:fillRef idx="0"/>
+    <cs:effectRef idx="0"/>
+    <cs:fontRef idx="minor">
+      <a:schemeClr val="tx1"/>
+    </cs:fontRef>
+    <cs:spPr>
+      <a:ln w="9525" cap="flat" cmpd="sng" algn="ctr">
+        <a:solidFill>
+          <a:schemeClr val="tx1">
+            <a:lumMod val="15000"/>
+            <a:lumOff val="85000"/>
+          </a:schemeClr>
+        </a:solidFill>
+        <a:round/>
+      </a:ln>
+    </cs:spPr>
+  </cs:gridlineMajor>
+  <cs:gridlineMinor>
+    <cs:lnRef idx="0"/>
+    <cs:fillRef idx="0"/>
+    <cs:effectRef idx="0"/>
+    <cs:fontRef idx="minor">
+      <a:schemeClr val="tx1"/>
+    </cs:fontRef>
+    <cs:spPr>
+      <a:ln w="9525" cap="flat" cmpd="sng" algn="ctr">
+        <a:solidFill>
+          <a:schemeClr val="tx1">
+            <a:lumMod val="5000"/>
+            <a:lumOff val="95000"/>
+          </a:schemeClr>
+        </a:solidFill>
+        <a:round/>
+      </a:ln>
+    </cs:spPr>
+  </cs:gridlineMinor>
+  <cs:hiLoLine>
+    <cs:lnRef idx="0"/>
+    <cs:fillRef idx="0"/>
+    <cs:effectRef idx="0"/>
+    <cs:fontRef idx="minor">
+      <a:schemeClr val="tx1"/>
+    </cs:fontRef>
+    <cs:spPr>
+      <a:ln w="9525" cap="flat" cmpd="sng" algn="ctr">
+        <a:solidFill>
+          <a:schemeClr val="tx1">
+            <a:lumMod val="50000"/>
+            <a:lumOff val="50000"/>
+          </a:schemeClr>
+        </a:solidFill>
+        <a:round/>
+      </a:ln>
+    </cs:spPr>
+  </cs:hiLoLine>
+  <cs:leaderLine>
+    <cs:lnRef idx="0"/>
+    <cs:fillRef idx="0"/>
+    <cs:effectRef idx="0"/>
+    <cs:fontRef idx="minor">
+      <a:schemeClr val="tx1"/>
+    </cs:fontRef>
+    <cs:spPr>
+      <a:ln w="9525" cap="flat" cmpd="sng" algn="ctr">
+        <a:solidFill>
+          <a:schemeClr val="tx1">
+            <a:lumMod val="35000"/>
+            <a:lumOff val="65000"/>
+          </a:schemeClr>
+        </a:solidFill>
+        <a:round/>
+      </a:ln>
+    </cs:spPr>
+  </cs:leaderLine>
+  <cs:legend>
+    <cs:lnRef idx="0"/>
+    <cs:fillRef idx="0"/>
+    <cs:effectRef idx="0"/>
+    <cs:fontRef idx="minor">
+      <a:schemeClr val="tx1">
+        <a:lumMod val="65000"/>
+        <a:lumOff val="35000"/>
+      </a:schemeClr>
+    </cs:fontRef>
+    <cs:defRPr sz="1197" kern="1200"/>
+  </cs:legend>
+  <cs:plotArea mods="allowNoFillOverride allowNoLineOverride">
+    <cs:lnRef idx="0"/>
+    <cs:fillRef idx="0"/>
+    <cs:effectRef idx="0"/>
+    <cs:fontRef idx="minor">
+      <a:schemeClr val="tx1"/>
+    </cs:fontRef>
+  </cs:plotArea>
+  <cs:plotArea3D mods="allowNoFillOverride allowNoLineOverride">
+    <cs:lnRef idx="0"/>
+    <cs:fillRef idx="0"/>
+    <cs:effectRef idx="0"/>
+    <cs:fontRef idx="minor">
+      <a:schemeClr val="tx1"/>
+    </cs:fontRef>
+  </cs:plotArea3D>
+  <cs:seriesAxis>
+    <cs:lnRef idx="0"/>
+    <cs:fillRef idx="0"/>
+    <cs:effectRef idx="0"/>
+    <cs:fontRef idx="minor">
+      <a:schemeClr val="tx1">
+        <a:lumMod val="65000"/>
+        <a:lumOff val="35000"/>
+      </a:schemeClr>
+    </cs:fontRef>
+    <cs:defRPr sz="1197" kern="1200"/>
+  </cs:seriesAxis>
+  <cs:seriesLine>
+    <cs:lnRef idx="0"/>
+    <cs:fillRef idx="0"/>
+    <cs:effectRef idx="0"/>
+    <cs:fontRef idx="minor">
+      <a:schemeClr val="tx1"/>
+    </cs:fontRef>
+    <cs:spPr>
+      <a:ln w="9525" cap="flat" cmpd="sng" algn="ctr">
+        <a:solidFill>
+          <a:schemeClr val="tx1">
+            <a:lumMod val="35000"/>
+            <a:lumOff val="65000"/>
+          </a:schemeClr>
+        </a:solidFill>
+        <a:round/>
+      </a:ln>
+    </cs:spPr>
+  </cs:seriesLine>
+  <cs:title>
+    <cs:lnRef idx="0"/>
+    <cs:fillRef idx="0"/>
+    <cs:effectRef idx="0"/>
+    <cs:fontRef idx="minor">
+      <a:schemeClr val="tx1">
+        <a:lumMod val="65000"/>
+        <a:lumOff val="35000"/>
+      </a:schemeClr>
+    </cs:fontRef>
+    <cs:defRPr sz="1862" b="0" kern="1200" spc="0" baseline="0"/>
+  </cs:title>
+  <cs:trendline>
+    <cs:lnRef idx="0">
+      <cs:styleClr val="auto"/>
+    </cs:lnRef>
+    <cs:fillRef idx="0"/>
+    <cs:effectRef idx="0"/>
+    <cs:fontRef idx="minor">
+      <a:schemeClr val="tx1"/>
+    </cs:fontRef>
+    <cs:spPr>
+      <a:ln w="19050" cap="rnd">
+        <a:solidFill>
+          <a:schemeClr val="phClr"/>
+        </a:solidFill>
+        <a:prstDash val="sysDot"/>
+      </a:ln>
+    </cs:spPr>
+  </cs:trendline>
+  <cs:trendlineLabel>
+    <cs:lnRef idx="0"/>
+    <cs:fillRef idx="0"/>
+    <cs:effectRef idx="0"/>
+    <cs:fontRef idx="minor">
+      <a:schemeClr val="tx1">
+        <a:lumMod val="65000"/>
+        <a:lumOff val="35000"/>
+      </a:schemeClr>
+    </cs:fontRef>
+    <cs:defRPr sz="1197" kern="1200"/>
+  </cs:trendlineLabel>
+  <cs:upBar>
+    <cs:lnRef idx="0"/>
+    <cs:fillRef idx="0"/>
+    <cs:effectRef idx="0"/>
+    <cs:fontRef idx="minor">
+      <a:schemeClr val="tx1"/>
+    </cs:fontRef>
+    <cs:spPr>
+      <a:solidFill>
+        <a:schemeClr val="lt1"/>
+      </a:solidFill>
+      <a:ln w="9525" cap="flat" cmpd="sng" algn="ctr">
+        <a:solidFill>
+          <a:schemeClr val="tx1">
+            <a:lumMod val="65000"/>
+            <a:lumOff val="35000"/>
+          </a:schemeClr>
+        </a:solidFill>
+        <a:round/>
+      </a:ln>
+    </cs:spPr>
+  </cs:upBar>
+  <cs:valueAxis>
+    <cs:lnRef idx="0"/>
+    <cs:fillRef idx="0"/>
+    <cs:effectRef idx="0"/>
+    <cs:fontRef idx="minor">
+      <a:schemeClr val="tx1">
+        <a:lumMod val="65000"/>
+        <a:lumOff val="35000"/>
+      </a:schemeClr>
+    </cs:fontRef>
+    <cs:defRPr sz="1197" kern="1200"/>
+  </cs:valueAxis>
+  <cs:wall>
+    <cs:lnRef idx="0"/>
+    <cs:fillRef idx="0"/>
+    <cs:effectRef idx="0"/>
+    <cs:fontRef idx="minor">
+      <a:schemeClr val="tx1"/>
+    </cs:fontRef>
+    <cs:spPr>
+      <a:noFill/>
+      <a:ln>
+        <a:noFill/>
+      </a:ln>
+    </cs:spPr>
+  </cs:wall>
+</cs:chartStyle>
 </file>
 
 <file path=ppt/slideLayouts/slideLayout1.xml><?xml version="1.0" encoding="utf-8"?>
@@ -446,7 +2506,7 @@
             <a:fld id="{5923F103-BC34-4FE4-A40E-EDDEECFDA5D0}" type="datetimeFigureOut">
               <a:rPr lang="en-US" dirty="0"/>
               <a:pPr/>
-              <a:t>4/17/24</a:t>
+              <a:t>4/22/24</a:t>
             </a:fld>
             <a:endParaRPr lang="en-US" dirty="0"/>
           </a:p>
@@ -1530,7 +3590,7 @@
           <a:p>
             <a:fld id="{923A1CC3-2375-41D4-9E03-427CAF2A4C1A}" type="datetimeFigureOut">
               <a:rPr lang="en-US" dirty="0"/>
-              <a:t>4/17/24</a:t>
+              <a:t>4/22/24</a:t>
             </a:fld>
             <a:endParaRPr lang="en-US" dirty="0"/>
           </a:p>
@@ -2506,7 +4566,7 @@
           <a:p>
             <a:fld id="{AFF16868-8199-4C2C-A5B1-63AEE139F88E}" type="datetimeFigureOut">
               <a:rPr lang="en-US" dirty="0"/>
-              <a:t>4/17/24</a:t>
+              <a:t>4/22/24</a:t>
             </a:fld>
             <a:endParaRPr lang="en-US" dirty="0"/>
           </a:p>
@@ -3636,7 +5696,7 @@
           <a:p>
             <a:fld id="{AAD9FF7F-6988-44CC-821B-644E70CD2F73}" type="datetimeFigureOut">
               <a:rPr lang="en-US" dirty="0"/>
-              <a:t>4/17/24</a:t>
+              <a:t>4/22/24</a:t>
             </a:fld>
             <a:endParaRPr lang="en-US" dirty="0"/>
           </a:p>
@@ -4665,7 +6725,7 @@
           <a:p>
             <a:fld id="{5C12C299-16B2-4475-990D-751901EACC14}" type="datetimeFigureOut">
               <a:rPr lang="en-US" dirty="0"/>
-              <a:t>4/17/24</a:t>
+              <a:t>4/22/24</a:t>
             </a:fld>
             <a:endParaRPr lang="en-US" dirty="0"/>
           </a:p>
@@ -5321,7 +7381,7 @@
           <a:p>
             <a:fld id="{9FE86839-B9D8-4651-8783-F325ECE74E65}" type="datetimeFigureOut">
               <a:rPr lang="en-US" dirty="0"/>
-              <a:t>4/17/24</a:t>
+              <a:t>4/22/24</a:t>
             </a:fld>
             <a:endParaRPr lang="en-US" dirty="0"/>
           </a:p>
@@ -6178,7 +8238,7 @@
           <a:p>
             <a:fld id="{FD484F64-32F6-45C5-931F-ADC1662401D0}" type="datetimeFigureOut">
               <a:rPr lang="en-US" dirty="0"/>
-              <a:t>4/17/24</a:t>
+              <a:t>4/22/24</a:t>
             </a:fld>
             <a:endParaRPr lang="en-US" dirty="0"/>
           </a:p>
@@ -6364,7 +8424,7 @@
           <a:p>
             <a:fld id="{53086D93-FCAC-47E0-A2EE-787E62CA814C}" type="datetimeFigureOut">
               <a:rPr lang="en-US" dirty="0"/>
-              <a:t>4/17/24</a:t>
+              <a:t>4/22/24</a:t>
             </a:fld>
             <a:endParaRPr lang="en-US" dirty="0"/>
           </a:p>
@@ -7332,7 +9392,7 @@
           <a:p>
             <a:fld id="{CDA879A6-0FD0-4734-A311-86BFCA472E6E}" type="datetimeFigureOut">
               <a:rPr lang="en-US" dirty="0"/>
-              <a:t>4/17/24</a:t>
+              <a:t>4/22/24</a:t>
             </a:fld>
             <a:endParaRPr lang="en-US" dirty="0"/>
           </a:p>
@@ -7539,7 +9599,7 @@
           <a:p>
             <a:fld id="{19C9CA7B-DFD4-44B5-8C60-D14B8CD1FB59}" type="datetimeFigureOut">
               <a:rPr lang="en-US" dirty="0"/>
-              <a:t>4/17/24</a:t>
+              <a:t>4/22/24</a:t>
             </a:fld>
             <a:endParaRPr lang="en-US" dirty="0"/>
           </a:p>
@@ -8569,7 +10629,7 @@
           <a:p>
             <a:fld id="{F34E6425-0181-43F2-84FC-787E803FD2F8}" type="datetimeFigureOut">
               <a:rPr lang="en-US" dirty="0"/>
-              <a:t>4/17/24</a:t>
+              <a:t>4/22/24</a:t>
             </a:fld>
             <a:endParaRPr lang="en-US" dirty="0"/>
           </a:p>
@@ -8837,7 +10897,7 @@
           <a:p>
             <a:fld id="{3BDB8791-F1B0-41E7-B7FD-A781E65C4266}" type="datetimeFigureOut">
               <a:rPr lang="en-US" dirty="0"/>
-              <a:t>4/17/24</a:t>
+              <a:t>4/22/24</a:t>
             </a:fld>
             <a:endParaRPr lang="en-US" dirty="0"/>
           </a:p>
@@ -9243,7 +11303,7 @@
           <a:p>
             <a:fld id="{5FDD63B2-E120-4ED8-B27B-C685F510A5FE}" type="datetimeFigureOut">
               <a:rPr lang="en-US" dirty="0"/>
-              <a:t>4/17/24</a:t>
+              <a:t>4/22/24</a:t>
             </a:fld>
             <a:endParaRPr lang="en-US" dirty="0"/>
           </a:p>
@@ -9366,7 +11426,7 @@
           <a:p>
             <a:fld id="{7AA18ACC-A947-437B-A130-35BD54FDF1E9}" type="datetimeFigureOut">
               <a:rPr lang="en-US" dirty="0"/>
-              <a:t>4/17/24</a:t>
+              <a:t>4/22/24</a:t>
             </a:fld>
             <a:endParaRPr lang="en-US" dirty="0"/>
           </a:p>
@@ -9457,7 +11517,7 @@
           <a:p>
             <a:fld id="{7C8D7E02-BCB8-4D50-A234-369438C08659}" type="datetimeFigureOut">
               <a:rPr lang="en-US" dirty="0"/>
-              <a:t>4/17/24</a:t>
+              <a:t>4/22/24</a:t>
             </a:fld>
             <a:endParaRPr lang="en-US" dirty="0"/>
           </a:p>
@@ -10534,7 +12594,7 @@
           <a:p>
             <a:fld id="{76E86A4C-8E40-4F87-A4F0-01A0687C5742}" type="datetimeFigureOut">
               <a:rPr lang="en-US" dirty="0"/>
-              <a:t>4/17/24</a:t>
+              <a:t>4/22/24</a:t>
             </a:fld>
             <a:endParaRPr lang="en-US" dirty="0"/>
           </a:p>
@@ -11638,7 +13698,7 @@
           <a:p>
             <a:fld id="{35E72C73-2D91-4E12-BA25-F0AA0C03599B}" type="datetimeFigureOut">
               <a:rPr lang="en-US" dirty="0"/>
-              <a:t>4/17/24</a:t>
+              <a:t>4/22/24</a:t>
             </a:fld>
             <a:endParaRPr lang="en-US" dirty="0"/>
           </a:p>
@@ -12631,7 +14691,7 @@
           <a:p>
             <a:fld id="{2BE451C3-0FF4-47C4-B829-773ADF60F88C}" type="datetimeFigureOut">
               <a:rPr lang="en-US" dirty="0"/>
-              <a:t>4/17/24</a:t>
+              <a:t>4/22/24</a:t>
             </a:fld>
             <a:endParaRPr lang="en-US" dirty="0"/>
           </a:p>
@@ -13299,7 +15359,368 @@
           <a:p>
             <a:r>
               <a:rPr lang="en-US" dirty="0"/>
-              <a:t>Test 1</a:t>
+              <a:t>Page with Table</a:t>
+            </a:r>
+          </a:p>
+        </p:txBody>
+      </p:sp>
+      <p:graphicFrame>
+        <p:nvGraphicFramePr>
+          <p:cNvPr id="6" name="Content Placeholder 5">
+            <a:extLst>
+              <a:ext uri="{FF2B5EF4-FFF2-40B4-BE49-F238E27FC236}">
+                <a16:creationId xmlns:a16="http://schemas.microsoft.com/office/drawing/2014/main" id="{1186EA75-0673-DD5A-A6E6-D0B6645C8C39}"/>
+              </a:ext>
+            </a:extLst>
+          </p:cNvPr>
+          <p:cNvGraphicFramePr>
+            <a:graphicFrameLocks noGrp="1"/>
+          </p:cNvGraphicFramePr>
+          <p:nvPr>
+            <p:ph idx="1"/>
+            <p:extLst>
+              <p:ext uri="{D42A27DB-BD31-4B8C-83A1-F6EECF244321}">
+                <p14:modId xmlns:p14="http://schemas.microsoft.com/office/powerpoint/2010/main" val="4027850225"/>
+              </p:ext>
+            </p:extLst>
+          </p:nvPr>
+        </p:nvGraphicFramePr>
+        <p:xfrm>
+          <a:off x="1155700" y="2603500"/>
+          <a:ext cx="8824910" cy="741680"/>
+        </p:xfrm>
+        <a:graphic>
+          <a:graphicData uri="http://schemas.openxmlformats.org/drawingml/2006/table">
+            <a:tbl>
+              <a:tblPr firstRow="1" bandRow="1">
+                <a:tableStyleId>{5C22544A-7EE6-4342-B048-85BDC9FD1C3A}</a:tableStyleId>
+              </a:tblPr>
+              <a:tblGrid>
+                <a:gridCol w="1764982">
+                  <a:extLst>
+                    <a:ext uri="{9D8B030D-6E8A-4147-A177-3AD203B41FA5}">
+                      <a16:colId xmlns:a16="http://schemas.microsoft.com/office/drawing/2014/main" val="379870486"/>
+                    </a:ext>
+                  </a:extLst>
+                </a:gridCol>
+                <a:gridCol w="1764982">
+                  <a:extLst>
+                    <a:ext uri="{9D8B030D-6E8A-4147-A177-3AD203B41FA5}">
+                      <a16:colId xmlns:a16="http://schemas.microsoft.com/office/drawing/2014/main" val="1921641235"/>
+                    </a:ext>
+                  </a:extLst>
+                </a:gridCol>
+                <a:gridCol w="1764982">
+                  <a:extLst>
+                    <a:ext uri="{9D8B030D-6E8A-4147-A177-3AD203B41FA5}">
+                      <a16:colId xmlns:a16="http://schemas.microsoft.com/office/drawing/2014/main" val="2592845913"/>
+                    </a:ext>
+                  </a:extLst>
+                </a:gridCol>
+                <a:gridCol w="1764982">
+                  <a:extLst>
+                    <a:ext uri="{9D8B030D-6E8A-4147-A177-3AD203B41FA5}">
+                      <a16:colId xmlns:a16="http://schemas.microsoft.com/office/drawing/2014/main" val="1966425105"/>
+                    </a:ext>
+                  </a:extLst>
+                </a:gridCol>
+                <a:gridCol w="1764982">
+                  <a:extLst>
+                    <a:ext uri="{9D8B030D-6E8A-4147-A177-3AD203B41FA5}">
+                      <a16:colId xmlns:a16="http://schemas.microsoft.com/office/drawing/2014/main" val="3481511651"/>
+                    </a:ext>
+                  </a:extLst>
+                </a:gridCol>
+              </a:tblGrid>
+              <a:tr h="370840">
+                <a:tc>
+                  <a:txBody>
+                    <a:bodyPr/>
+                    <a:lstStyle/>
+                    <a:p>
+                      <a:r>
+                        <a:rPr lang="en-US" dirty="0"/>
+                        <a:t>Test TD 1</a:t>
+                      </a:r>
+                    </a:p>
+                  </a:txBody>
+                  <a:tcPr/>
+                </a:tc>
+                <a:tc>
+                  <a:txBody>
+                    <a:bodyPr/>
+                    <a:lstStyle/>
+                    <a:p>
+                      <a:r>
+                        <a:rPr lang="en-US" dirty="0"/>
+                        <a:t>Test TD 2</a:t>
+                      </a:r>
+                    </a:p>
+                  </a:txBody>
+                  <a:tcPr/>
+                </a:tc>
+                <a:tc>
+                  <a:txBody>
+                    <a:bodyPr/>
+                    <a:lstStyle/>
+                    <a:p>
+                      <a:r>
+                        <a:rPr lang="en-US" dirty="0"/>
+                        <a:t>Test TD 3</a:t>
+                      </a:r>
+                    </a:p>
+                  </a:txBody>
+                  <a:tcPr/>
+                </a:tc>
+                <a:tc>
+                  <a:txBody>
+                    <a:bodyPr/>
+                    <a:lstStyle/>
+                    <a:p>
+                      <a:r>
+                        <a:rPr lang="en-US" dirty="0"/>
+                        <a:t>Test TD 4</a:t>
+                      </a:r>
+                    </a:p>
+                  </a:txBody>
+                  <a:tcPr/>
+                </a:tc>
+                <a:tc>
+                  <a:txBody>
+                    <a:bodyPr/>
+                    <a:lstStyle/>
+                    <a:p>
+                      <a:r>
+                        <a:rPr lang="en-US" dirty="0"/>
+                        <a:t>Test TD 5</a:t>
+                      </a:r>
+                    </a:p>
+                  </a:txBody>
+                  <a:tcPr/>
+                </a:tc>
+                <a:extLst>
+                  <a:ext uri="{0D108BD9-81ED-4DB2-BD59-A6C34878D82A}">
+                    <a16:rowId xmlns:a16="http://schemas.microsoft.com/office/drawing/2014/main" val="1437216132"/>
+                  </a:ext>
+                </a:extLst>
+              </a:tr>
+              <a:tr h="370840">
+                <a:tc>
+                  <a:txBody>
+                    <a:bodyPr/>
+                    <a:lstStyle/>
+                    <a:p>
+                      <a:r>
+                        <a:rPr lang="en-US" dirty="0"/>
+                        <a:t>1</a:t>
+                      </a:r>
+                    </a:p>
+                  </a:txBody>
+                  <a:tcPr/>
+                </a:tc>
+                <a:tc>
+                  <a:txBody>
+                    <a:bodyPr/>
+                    <a:lstStyle/>
+                    <a:p>
+                      <a:r>
+                        <a:rPr lang="en-US" dirty="0"/>
+                        <a:t>2</a:t>
+                      </a:r>
+                    </a:p>
+                  </a:txBody>
+                  <a:tcPr/>
+                </a:tc>
+                <a:tc>
+                  <a:txBody>
+                    <a:bodyPr/>
+                    <a:lstStyle/>
+                    <a:p>
+                      <a:r>
+                        <a:rPr lang="en-US" dirty="0"/>
+                        <a:t>3</a:t>
+                      </a:r>
+                    </a:p>
+                  </a:txBody>
+                  <a:tcPr/>
+                </a:tc>
+                <a:tc>
+                  <a:txBody>
+                    <a:bodyPr/>
+                    <a:lstStyle/>
+                    <a:p>
+                      <a:r>
+                        <a:rPr lang="en-US" dirty="0"/>
+                        <a:t>4</a:t>
+                      </a:r>
+                    </a:p>
+                  </a:txBody>
+                  <a:tcPr/>
+                </a:tc>
+                <a:tc>
+                  <a:txBody>
+                    <a:bodyPr/>
+                    <a:lstStyle/>
+                    <a:p>
+                      <a:r>
+                        <a:rPr lang="en-US" dirty="0"/>
+                        <a:t>5</a:t>
+                      </a:r>
+                    </a:p>
+                  </a:txBody>
+                  <a:tcPr/>
+                </a:tc>
+                <a:extLst>
+                  <a:ext uri="{0D108BD9-81ED-4DB2-BD59-A6C34878D82A}">
+                    <a16:rowId xmlns:a16="http://schemas.microsoft.com/office/drawing/2014/main" val="3571477430"/>
+                  </a:ext>
+                </a:extLst>
+              </a:tr>
+            </a:tbl>
+          </a:graphicData>
+        </a:graphic>
+      </p:graphicFrame>
+    </p:spTree>
+    <p:extLst>
+      <p:ext uri="{BB962C8B-B14F-4D97-AF65-F5344CB8AC3E}">
+        <p14:creationId xmlns:p14="http://schemas.microsoft.com/office/powerpoint/2010/main" val="758228969"/>
+      </p:ext>
+    </p:extLst>
+  </p:cSld>
+  <p:clrMapOvr>
+    <a:masterClrMapping/>
+  </p:clrMapOvr>
+</p:sld>
+</file>
+
+<file path=ppt/slides/slide3.xml><?xml version="1.0" encoding="utf-8"?>
+<p:sld xmlns:a="http://schemas.openxmlformats.org/drawingml/2006/main" xmlns:r="http://schemas.openxmlformats.org/officeDocument/2006/relationships" xmlns:p="http://schemas.openxmlformats.org/presentationml/2006/main">
+  <p:cSld>
+    <p:spTree>
+      <p:nvGrpSpPr>
+        <p:cNvPr id="1" name=""/>
+        <p:cNvGrpSpPr/>
+        <p:nvPr/>
+      </p:nvGrpSpPr>
+      <p:grpSpPr>
+        <a:xfrm>
+          <a:off x="0" y="0"/>
+          <a:ext cx="0" cy="0"/>
+          <a:chOff x="0" y="0"/>
+          <a:chExt cx="0" cy="0"/>
+        </a:xfrm>
+      </p:grpSpPr>
+      <p:sp>
+        <p:nvSpPr>
+          <p:cNvPr id="2" name="Title 1">
+            <a:extLst>
+              <a:ext uri="{FF2B5EF4-FFF2-40B4-BE49-F238E27FC236}">
+                <a16:creationId xmlns:a16="http://schemas.microsoft.com/office/drawing/2014/main" id="{D019DAC9-E390-1FAF-3F5D-5EF68816ED43}"/>
+              </a:ext>
+            </a:extLst>
+          </p:cNvPr>
+          <p:cNvSpPr>
+            <a:spLocks noGrp="1"/>
+          </p:cNvSpPr>
+          <p:nvPr>
+            <p:ph type="title"/>
+          </p:nvPr>
+        </p:nvSpPr>
+        <p:spPr/>
+        <p:txBody>
+          <a:bodyPr/>
+          <a:lstStyle/>
+          <a:p>
+            <a:r>
+              <a:rPr lang="en-US" dirty="0"/>
+              <a:t>Page with Image</a:t>
+            </a:r>
+          </a:p>
+        </p:txBody>
+      </p:sp>
+      <p:pic>
+        <p:nvPicPr>
+          <p:cNvPr id="5" name="Content Placeholder 4" descr="A brown llama with white text&#10;&#10;Description automatically generated">
+            <a:extLst>
+              <a:ext uri="{FF2B5EF4-FFF2-40B4-BE49-F238E27FC236}">
+                <a16:creationId xmlns:a16="http://schemas.microsoft.com/office/drawing/2014/main" id="{034C0E7A-1CF1-F694-584D-62E786159C53}"/>
+              </a:ext>
+            </a:extLst>
+          </p:cNvPr>
+          <p:cNvPicPr>
+            <a:picLocks noGrp="1" noChangeAspect="1"/>
+          </p:cNvPicPr>
+          <p:nvPr>
+            <p:ph idx="1"/>
+          </p:nvPr>
+        </p:nvPicPr>
+        <p:blipFill>
+          <a:blip r:embed="rId2"/>
+          <a:stretch>
+            <a:fillRect/>
+          </a:stretch>
+        </p:blipFill>
+        <p:spPr>
+          <a:xfrm>
+            <a:off x="2151856" y="2603500"/>
+            <a:ext cx="6832600" cy="3416300"/>
+          </a:xfrm>
+        </p:spPr>
+      </p:pic>
+    </p:spTree>
+    <p:extLst>
+      <p:ext uri="{BB962C8B-B14F-4D97-AF65-F5344CB8AC3E}">
+        <p14:creationId xmlns:p14="http://schemas.microsoft.com/office/powerpoint/2010/main" val="3696062338"/>
+      </p:ext>
+    </p:extLst>
+  </p:cSld>
+  <p:clrMapOvr>
+    <a:masterClrMapping/>
+  </p:clrMapOvr>
+</p:sld>
+</file>
+
+<file path=ppt/slides/slide4.xml><?xml version="1.0" encoding="utf-8"?>
+<p:sld xmlns:a="http://schemas.openxmlformats.org/drawingml/2006/main" xmlns:r="http://schemas.openxmlformats.org/officeDocument/2006/relationships" xmlns:p="http://schemas.openxmlformats.org/presentationml/2006/main">
+  <p:cSld>
+    <p:spTree>
+      <p:nvGrpSpPr>
+        <p:cNvPr id="1" name=""/>
+        <p:cNvGrpSpPr/>
+        <p:nvPr/>
+      </p:nvGrpSpPr>
+      <p:grpSpPr>
+        <a:xfrm>
+          <a:off x="0" y="0"/>
+          <a:ext cx="0" cy="0"/>
+          <a:chOff x="0" y="0"/>
+          <a:chExt cx="0" cy="0"/>
+        </a:xfrm>
+      </p:grpSpPr>
+      <p:sp>
+        <p:nvSpPr>
+          <p:cNvPr id="2" name="Title 1">
+            <a:extLst>
+              <a:ext uri="{FF2B5EF4-FFF2-40B4-BE49-F238E27FC236}">
+                <a16:creationId xmlns:a16="http://schemas.microsoft.com/office/drawing/2014/main" id="{1036032E-9F9E-44B7-5679-DEE45E557E89}"/>
+              </a:ext>
+            </a:extLst>
+          </p:cNvPr>
+          <p:cNvSpPr>
+            <a:spLocks noGrp="1"/>
+          </p:cNvSpPr>
+          <p:nvPr>
+            <p:ph type="title"/>
+          </p:nvPr>
+        </p:nvSpPr>
+        <p:spPr/>
+        <p:txBody>
+          <a:bodyPr/>
+          <a:lstStyle/>
+          <a:p>
+            <a:r>
+              <a:rPr lang="en-US" dirty="0"/>
+              <a:t>Page with Narrative and List</a:t>
             </a:r>
           </a:p>
         </p:txBody>
@@ -13309,7 +15730,7 @@
           <p:cNvPr id="3" name="Content Placeholder 2">
             <a:extLst>
               <a:ext uri="{FF2B5EF4-FFF2-40B4-BE49-F238E27FC236}">
-                <a16:creationId xmlns:a16="http://schemas.microsoft.com/office/drawing/2014/main" id="{C199C730-4759-55F4-4AA2-F8B693A2A4A7}"/>
+                <a16:creationId xmlns:a16="http://schemas.microsoft.com/office/drawing/2014/main" id="{9B007A68-D600-93DE-6A82-2C1804A07300}"/>
               </a:ext>
             </a:extLst>
           </p:cNvPr>
@@ -13320,9 +15741,16 @@
             <p:ph idx="1"/>
           </p:nvPr>
         </p:nvSpPr>
-        <p:spPr/>
+        <p:spPr>
+          <a:xfrm>
+            <a:off x="1081382" y="2565618"/>
+            <a:ext cx="4362977" cy="3318713"/>
+          </a:xfrm>
+        </p:spPr>
         <p:txBody>
-          <a:bodyPr/>
+          <a:bodyPr>
+            <a:normAutofit/>
+          </a:bodyPr>
           <a:lstStyle/>
           <a:p>
             <a:r>
@@ -13607,10 +16035,587 @@
           </a:p>
         </p:txBody>
       </p:sp>
+      <p:sp>
+        <p:nvSpPr>
+          <p:cNvPr id="4" name="Content Placeholder 2">
+            <a:extLst>
+              <a:ext uri="{FF2B5EF4-FFF2-40B4-BE49-F238E27FC236}">
+                <a16:creationId xmlns:a16="http://schemas.microsoft.com/office/drawing/2014/main" id="{1FCAC631-3B0E-A855-334F-6FE429B62DB7}"/>
+              </a:ext>
+            </a:extLst>
+          </p:cNvPr>
+          <p:cNvSpPr txBox="1">
+            <a:spLocks/>
+          </p:cNvSpPr>
+          <p:nvPr/>
+        </p:nvSpPr>
+        <p:spPr>
+          <a:xfrm>
+            <a:off x="6096000" y="2654956"/>
+            <a:ext cx="4362977" cy="3318713"/>
+          </a:xfrm>
+          <a:prstGeom prst="rect">
+            <a:avLst/>
+          </a:prstGeom>
+        </p:spPr>
+        <p:txBody>
+          <a:bodyPr vert="horz" lIns="91440" tIns="45720" rIns="91440" bIns="45720" rtlCol="0">
+            <a:normAutofit/>
+          </a:bodyPr>
+          <a:lstStyle>
+            <a:lvl1pPr marL="342900" indent="-342900" algn="l" defTabSz="457200" rtl="0" eaLnBrk="1" latinLnBrk="0" hangingPunct="1">
+              <a:spcBef>
+                <a:spcPts val="1000"/>
+              </a:spcBef>
+              <a:spcAft>
+                <a:spcPts val="0"/>
+              </a:spcAft>
+              <a:buClr>
+                <a:schemeClr val="accent1"/>
+              </a:buClr>
+              <a:buSzPct val="80000"/>
+              <a:buFont typeface="Wingdings 3" charset="2"/>
+              <a:buChar char=""/>
+              <a:defRPr sz="1800" b="0" i="0" kern="1200">
+                <a:solidFill>
+                  <a:schemeClr val="tx1">
+                    <a:lumMod val="75000"/>
+                    <a:lumOff val="25000"/>
+                  </a:schemeClr>
+                </a:solidFill>
+                <a:latin typeface="+mn-lt"/>
+                <a:ea typeface="+mn-ea"/>
+                <a:cs typeface="+mn-cs"/>
+              </a:defRPr>
+            </a:lvl1pPr>
+            <a:lvl2pPr marL="742950" indent="-285750" algn="l" defTabSz="457200" rtl="0" eaLnBrk="1" latinLnBrk="0" hangingPunct="1">
+              <a:spcBef>
+                <a:spcPts val="1000"/>
+              </a:spcBef>
+              <a:spcAft>
+                <a:spcPts val="0"/>
+              </a:spcAft>
+              <a:buClr>
+                <a:schemeClr val="accent1"/>
+              </a:buClr>
+              <a:buSzPct val="80000"/>
+              <a:buFont typeface="Wingdings 3" charset="2"/>
+              <a:buChar char=""/>
+              <a:defRPr sz="1600" b="0" i="0" kern="1200">
+                <a:solidFill>
+                  <a:schemeClr val="tx1">
+                    <a:lumMod val="75000"/>
+                    <a:lumOff val="25000"/>
+                  </a:schemeClr>
+                </a:solidFill>
+                <a:latin typeface="+mn-lt"/>
+                <a:ea typeface="+mn-ea"/>
+                <a:cs typeface="+mn-cs"/>
+              </a:defRPr>
+            </a:lvl2pPr>
+            <a:lvl3pPr marL="1143000" indent="-228600" algn="l" defTabSz="457200" rtl="0" eaLnBrk="1" latinLnBrk="0" hangingPunct="1">
+              <a:spcBef>
+                <a:spcPts val="1000"/>
+              </a:spcBef>
+              <a:spcAft>
+                <a:spcPts val="0"/>
+              </a:spcAft>
+              <a:buClr>
+                <a:schemeClr val="accent1"/>
+              </a:buClr>
+              <a:buSzPct val="80000"/>
+              <a:buFont typeface="Wingdings 3" charset="2"/>
+              <a:buChar char=""/>
+              <a:defRPr sz="1400" b="0" i="0" kern="1200">
+                <a:solidFill>
+                  <a:schemeClr val="tx1">
+                    <a:lumMod val="75000"/>
+                    <a:lumOff val="25000"/>
+                  </a:schemeClr>
+                </a:solidFill>
+                <a:latin typeface="+mn-lt"/>
+                <a:ea typeface="+mn-ea"/>
+                <a:cs typeface="+mn-cs"/>
+              </a:defRPr>
+            </a:lvl3pPr>
+            <a:lvl4pPr marL="1600200" indent="-228600" algn="l" defTabSz="457200" rtl="0" eaLnBrk="1" latinLnBrk="0" hangingPunct="1">
+              <a:spcBef>
+                <a:spcPts val="1000"/>
+              </a:spcBef>
+              <a:spcAft>
+                <a:spcPts val="0"/>
+              </a:spcAft>
+              <a:buClr>
+                <a:schemeClr val="accent1"/>
+              </a:buClr>
+              <a:buSzPct val="80000"/>
+              <a:buFont typeface="Wingdings 3" charset="2"/>
+              <a:buChar char=""/>
+              <a:defRPr sz="1200" b="0" i="0" kern="1200">
+                <a:solidFill>
+                  <a:schemeClr val="tx1">
+                    <a:lumMod val="75000"/>
+                    <a:lumOff val="25000"/>
+                  </a:schemeClr>
+                </a:solidFill>
+                <a:latin typeface="+mn-lt"/>
+                <a:ea typeface="+mn-ea"/>
+                <a:cs typeface="+mn-cs"/>
+              </a:defRPr>
+            </a:lvl4pPr>
+            <a:lvl5pPr marL="2057400" indent="-228600" algn="l" defTabSz="457200" rtl="0" eaLnBrk="1" latinLnBrk="0" hangingPunct="1">
+              <a:spcBef>
+                <a:spcPts val="1000"/>
+              </a:spcBef>
+              <a:spcAft>
+                <a:spcPts val="0"/>
+              </a:spcAft>
+              <a:buClr>
+                <a:schemeClr val="accent1"/>
+              </a:buClr>
+              <a:buSzPct val="80000"/>
+              <a:buFont typeface="Wingdings 3" charset="2"/>
+              <a:buChar char=""/>
+              <a:defRPr sz="1200" b="0" i="0" kern="1200">
+                <a:solidFill>
+                  <a:schemeClr val="tx1">
+                    <a:lumMod val="75000"/>
+                    <a:lumOff val="25000"/>
+                  </a:schemeClr>
+                </a:solidFill>
+                <a:latin typeface="+mn-lt"/>
+                <a:ea typeface="+mn-ea"/>
+                <a:cs typeface="+mn-cs"/>
+              </a:defRPr>
+            </a:lvl5pPr>
+            <a:lvl6pPr marL="2514600" indent="-228600" algn="l" defTabSz="457200" rtl="0" eaLnBrk="1" latinLnBrk="0" hangingPunct="1">
+              <a:spcBef>
+                <a:spcPts val="1000"/>
+              </a:spcBef>
+              <a:spcAft>
+                <a:spcPts val="0"/>
+              </a:spcAft>
+              <a:buClr>
+                <a:schemeClr val="accent1"/>
+              </a:buClr>
+              <a:buSzPct val="80000"/>
+              <a:buFont typeface="Wingdings 3" charset="2"/>
+              <a:buChar char=""/>
+              <a:defRPr sz="1200" b="0" i="0" kern="1200">
+                <a:solidFill>
+                  <a:schemeClr val="tx1">
+                    <a:lumMod val="75000"/>
+                    <a:lumOff val="25000"/>
+                  </a:schemeClr>
+                </a:solidFill>
+                <a:latin typeface="+mn-lt"/>
+                <a:ea typeface="+mn-ea"/>
+                <a:cs typeface="+mn-cs"/>
+              </a:defRPr>
+            </a:lvl6pPr>
+            <a:lvl7pPr marL="2971800" indent="-228600" algn="l" defTabSz="457200" rtl="0" eaLnBrk="1" latinLnBrk="0" hangingPunct="1">
+              <a:spcBef>
+                <a:spcPts val="1000"/>
+              </a:spcBef>
+              <a:spcAft>
+                <a:spcPts val="0"/>
+              </a:spcAft>
+              <a:buClr>
+                <a:schemeClr val="accent1"/>
+              </a:buClr>
+              <a:buSzPct val="80000"/>
+              <a:buFont typeface="Wingdings 3" charset="2"/>
+              <a:buChar char=""/>
+              <a:defRPr sz="1200" b="0" i="0" kern="1200">
+                <a:solidFill>
+                  <a:schemeClr val="tx1">
+                    <a:lumMod val="75000"/>
+                    <a:lumOff val="25000"/>
+                  </a:schemeClr>
+                </a:solidFill>
+                <a:latin typeface="+mn-lt"/>
+                <a:ea typeface="+mn-ea"/>
+                <a:cs typeface="+mn-cs"/>
+              </a:defRPr>
+            </a:lvl7pPr>
+            <a:lvl8pPr marL="3429000" indent="-228600" algn="l" defTabSz="457200" rtl="0" eaLnBrk="1" latinLnBrk="0" hangingPunct="1">
+              <a:spcBef>
+                <a:spcPts val="1000"/>
+              </a:spcBef>
+              <a:spcAft>
+                <a:spcPts val="0"/>
+              </a:spcAft>
+              <a:buClr>
+                <a:schemeClr val="accent1"/>
+              </a:buClr>
+              <a:buSzPct val="80000"/>
+              <a:buFont typeface="Wingdings 3" charset="2"/>
+              <a:buChar char=""/>
+              <a:defRPr sz="1200" b="0" i="0" kern="1200">
+                <a:solidFill>
+                  <a:schemeClr val="tx1">
+                    <a:lumMod val="75000"/>
+                    <a:lumOff val="25000"/>
+                  </a:schemeClr>
+                </a:solidFill>
+                <a:latin typeface="+mn-lt"/>
+                <a:ea typeface="+mn-ea"/>
+                <a:cs typeface="+mn-cs"/>
+              </a:defRPr>
+            </a:lvl8pPr>
+            <a:lvl9pPr marL="3886200" indent="-228600" algn="l" defTabSz="457200" rtl="0" eaLnBrk="1" latinLnBrk="0" hangingPunct="1">
+              <a:spcBef>
+                <a:spcPts val="1000"/>
+              </a:spcBef>
+              <a:spcAft>
+                <a:spcPts val="0"/>
+              </a:spcAft>
+              <a:buClr>
+                <a:schemeClr val="accent1"/>
+              </a:buClr>
+              <a:buSzPct val="80000"/>
+              <a:buFont typeface="Wingdings 3" charset="2"/>
+              <a:buChar char=""/>
+              <a:defRPr sz="1200" b="0" i="0" kern="1200">
+                <a:solidFill>
+                  <a:schemeClr val="tx1">
+                    <a:lumMod val="75000"/>
+                    <a:lumOff val="25000"/>
+                  </a:schemeClr>
+                </a:solidFill>
+                <a:latin typeface="+mn-lt"/>
+                <a:ea typeface="+mn-ea"/>
+                <a:cs typeface="+mn-cs"/>
+              </a:defRPr>
+            </a:lvl9pPr>
+          </a:lstStyle>
+          <a:p>
+            <a:endParaRPr lang="en-US" dirty="0"/>
+          </a:p>
+        </p:txBody>
+      </p:sp>
+      <p:sp>
+        <p:nvSpPr>
+          <p:cNvPr id="5" name="Content Placeholder 2">
+            <a:extLst>
+              <a:ext uri="{FF2B5EF4-FFF2-40B4-BE49-F238E27FC236}">
+                <a16:creationId xmlns:a16="http://schemas.microsoft.com/office/drawing/2014/main" id="{97BF2D6C-FE01-1E9B-EBA3-6695D476879A}"/>
+              </a:ext>
+            </a:extLst>
+          </p:cNvPr>
+          <p:cNvSpPr txBox="1">
+            <a:spLocks/>
+          </p:cNvSpPr>
+          <p:nvPr/>
+        </p:nvSpPr>
+        <p:spPr>
+          <a:xfrm>
+            <a:off x="6095999" y="2565618"/>
+            <a:ext cx="4362977" cy="3318713"/>
+          </a:xfrm>
+          <a:prstGeom prst="rect">
+            <a:avLst/>
+          </a:prstGeom>
+        </p:spPr>
+        <p:txBody>
+          <a:bodyPr vert="horz" lIns="91440" tIns="45720" rIns="91440" bIns="45720" rtlCol="0">
+            <a:normAutofit/>
+          </a:bodyPr>
+          <a:lstStyle>
+            <a:lvl1pPr marL="342900" indent="-342900" algn="l" defTabSz="457200" rtl="0" eaLnBrk="1" latinLnBrk="0" hangingPunct="1">
+              <a:spcBef>
+                <a:spcPts val="1000"/>
+              </a:spcBef>
+              <a:spcAft>
+                <a:spcPts val="0"/>
+              </a:spcAft>
+              <a:buClr>
+                <a:schemeClr val="accent1"/>
+              </a:buClr>
+              <a:buSzPct val="80000"/>
+              <a:buFont typeface="Wingdings 3" charset="2"/>
+              <a:buChar char=""/>
+              <a:defRPr sz="1800" b="0" i="0" kern="1200">
+                <a:solidFill>
+                  <a:schemeClr val="tx1">
+                    <a:lumMod val="75000"/>
+                    <a:lumOff val="25000"/>
+                  </a:schemeClr>
+                </a:solidFill>
+                <a:latin typeface="+mn-lt"/>
+                <a:ea typeface="+mn-ea"/>
+                <a:cs typeface="+mn-cs"/>
+              </a:defRPr>
+            </a:lvl1pPr>
+            <a:lvl2pPr marL="742950" indent="-285750" algn="l" defTabSz="457200" rtl="0" eaLnBrk="1" latinLnBrk="0" hangingPunct="1">
+              <a:spcBef>
+                <a:spcPts val="1000"/>
+              </a:spcBef>
+              <a:spcAft>
+                <a:spcPts val="0"/>
+              </a:spcAft>
+              <a:buClr>
+                <a:schemeClr val="accent1"/>
+              </a:buClr>
+              <a:buSzPct val="80000"/>
+              <a:buFont typeface="Wingdings 3" charset="2"/>
+              <a:buChar char=""/>
+              <a:defRPr sz="1600" b="0" i="0" kern="1200">
+                <a:solidFill>
+                  <a:schemeClr val="tx1">
+                    <a:lumMod val="75000"/>
+                    <a:lumOff val="25000"/>
+                  </a:schemeClr>
+                </a:solidFill>
+                <a:latin typeface="+mn-lt"/>
+                <a:ea typeface="+mn-ea"/>
+                <a:cs typeface="+mn-cs"/>
+              </a:defRPr>
+            </a:lvl2pPr>
+            <a:lvl3pPr marL="1143000" indent="-228600" algn="l" defTabSz="457200" rtl="0" eaLnBrk="1" latinLnBrk="0" hangingPunct="1">
+              <a:spcBef>
+                <a:spcPts val="1000"/>
+              </a:spcBef>
+              <a:spcAft>
+                <a:spcPts val="0"/>
+              </a:spcAft>
+              <a:buClr>
+                <a:schemeClr val="accent1"/>
+              </a:buClr>
+              <a:buSzPct val="80000"/>
+              <a:buFont typeface="Wingdings 3" charset="2"/>
+              <a:buChar char=""/>
+              <a:defRPr sz="1400" b="0" i="0" kern="1200">
+                <a:solidFill>
+                  <a:schemeClr val="tx1">
+                    <a:lumMod val="75000"/>
+                    <a:lumOff val="25000"/>
+                  </a:schemeClr>
+                </a:solidFill>
+                <a:latin typeface="+mn-lt"/>
+                <a:ea typeface="+mn-ea"/>
+                <a:cs typeface="+mn-cs"/>
+              </a:defRPr>
+            </a:lvl3pPr>
+            <a:lvl4pPr marL="1600200" indent="-228600" algn="l" defTabSz="457200" rtl="0" eaLnBrk="1" latinLnBrk="0" hangingPunct="1">
+              <a:spcBef>
+                <a:spcPts val="1000"/>
+              </a:spcBef>
+              <a:spcAft>
+                <a:spcPts val="0"/>
+              </a:spcAft>
+              <a:buClr>
+                <a:schemeClr val="accent1"/>
+              </a:buClr>
+              <a:buSzPct val="80000"/>
+              <a:buFont typeface="Wingdings 3" charset="2"/>
+              <a:buChar char=""/>
+              <a:defRPr sz="1200" b="0" i="0" kern="1200">
+                <a:solidFill>
+                  <a:schemeClr val="tx1">
+                    <a:lumMod val="75000"/>
+                    <a:lumOff val="25000"/>
+                  </a:schemeClr>
+                </a:solidFill>
+                <a:latin typeface="+mn-lt"/>
+                <a:ea typeface="+mn-ea"/>
+                <a:cs typeface="+mn-cs"/>
+              </a:defRPr>
+            </a:lvl4pPr>
+            <a:lvl5pPr marL="2057400" indent="-228600" algn="l" defTabSz="457200" rtl="0" eaLnBrk="1" latinLnBrk="0" hangingPunct="1">
+              <a:spcBef>
+                <a:spcPts val="1000"/>
+              </a:spcBef>
+              <a:spcAft>
+                <a:spcPts val="0"/>
+              </a:spcAft>
+              <a:buClr>
+                <a:schemeClr val="accent1"/>
+              </a:buClr>
+              <a:buSzPct val="80000"/>
+              <a:buFont typeface="Wingdings 3" charset="2"/>
+              <a:buChar char=""/>
+              <a:defRPr sz="1200" b="0" i="0" kern="1200">
+                <a:solidFill>
+                  <a:schemeClr val="tx1">
+                    <a:lumMod val="75000"/>
+                    <a:lumOff val="25000"/>
+                  </a:schemeClr>
+                </a:solidFill>
+                <a:latin typeface="+mn-lt"/>
+                <a:ea typeface="+mn-ea"/>
+                <a:cs typeface="+mn-cs"/>
+              </a:defRPr>
+            </a:lvl5pPr>
+            <a:lvl6pPr marL="2514600" indent="-228600" algn="l" defTabSz="457200" rtl="0" eaLnBrk="1" latinLnBrk="0" hangingPunct="1">
+              <a:spcBef>
+                <a:spcPts val="1000"/>
+              </a:spcBef>
+              <a:spcAft>
+                <a:spcPts val="0"/>
+              </a:spcAft>
+              <a:buClr>
+                <a:schemeClr val="accent1"/>
+              </a:buClr>
+              <a:buSzPct val="80000"/>
+              <a:buFont typeface="Wingdings 3" charset="2"/>
+              <a:buChar char=""/>
+              <a:defRPr sz="1200" b="0" i="0" kern="1200">
+                <a:solidFill>
+                  <a:schemeClr val="tx1">
+                    <a:lumMod val="75000"/>
+                    <a:lumOff val="25000"/>
+                  </a:schemeClr>
+                </a:solidFill>
+                <a:latin typeface="+mn-lt"/>
+                <a:ea typeface="+mn-ea"/>
+                <a:cs typeface="+mn-cs"/>
+              </a:defRPr>
+            </a:lvl6pPr>
+            <a:lvl7pPr marL="2971800" indent="-228600" algn="l" defTabSz="457200" rtl="0" eaLnBrk="1" latinLnBrk="0" hangingPunct="1">
+              <a:spcBef>
+                <a:spcPts val="1000"/>
+              </a:spcBef>
+              <a:spcAft>
+                <a:spcPts val="0"/>
+              </a:spcAft>
+              <a:buClr>
+                <a:schemeClr val="accent1"/>
+              </a:buClr>
+              <a:buSzPct val="80000"/>
+              <a:buFont typeface="Wingdings 3" charset="2"/>
+              <a:buChar char=""/>
+              <a:defRPr sz="1200" b="0" i="0" kern="1200">
+                <a:solidFill>
+                  <a:schemeClr val="tx1">
+                    <a:lumMod val="75000"/>
+                    <a:lumOff val="25000"/>
+                  </a:schemeClr>
+                </a:solidFill>
+                <a:latin typeface="+mn-lt"/>
+                <a:ea typeface="+mn-ea"/>
+                <a:cs typeface="+mn-cs"/>
+              </a:defRPr>
+            </a:lvl7pPr>
+            <a:lvl8pPr marL="3429000" indent="-228600" algn="l" defTabSz="457200" rtl="0" eaLnBrk="1" latinLnBrk="0" hangingPunct="1">
+              <a:spcBef>
+                <a:spcPts val="1000"/>
+              </a:spcBef>
+              <a:spcAft>
+                <a:spcPts val="0"/>
+              </a:spcAft>
+              <a:buClr>
+                <a:schemeClr val="accent1"/>
+              </a:buClr>
+              <a:buSzPct val="80000"/>
+              <a:buFont typeface="Wingdings 3" charset="2"/>
+              <a:buChar char=""/>
+              <a:defRPr sz="1200" b="0" i="0" kern="1200">
+                <a:solidFill>
+                  <a:schemeClr val="tx1">
+                    <a:lumMod val="75000"/>
+                    <a:lumOff val="25000"/>
+                  </a:schemeClr>
+                </a:solidFill>
+                <a:latin typeface="+mn-lt"/>
+                <a:ea typeface="+mn-ea"/>
+                <a:cs typeface="+mn-cs"/>
+              </a:defRPr>
+            </a:lvl8pPr>
+            <a:lvl9pPr marL="3886200" indent="-228600" algn="l" defTabSz="457200" rtl="0" eaLnBrk="1" latinLnBrk="0" hangingPunct="1">
+              <a:spcBef>
+                <a:spcPts val="1000"/>
+              </a:spcBef>
+              <a:spcAft>
+                <a:spcPts val="0"/>
+              </a:spcAft>
+              <a:buClr>
+                <a:schemeClr val="accent1"/>
+              </a:buClr>
+              <a:buSzPct val="80000"/>
+              <a:buFont typeface="Wingdings 3" charset="2"/>
+              <a:buChar char=""/>
+              <a:defRPr sz="1200" b="0" i="0" kern="1200">
+                <a:solidFill>
+                  <a:schemeClr val="tx1">
+                    <a:lumMod val="75000"/>
+                    <a:lumOff val="25000"/>
+                  </a:schemeClr>
+                </a:solidFill>
+                <a:latin typeface="+mn-lt"/>
+                <a:ea typeface="+mn-ea"/>
+                <a:cs typeface="+mn-cs"/>
+              </a:defRPr>
+            </a:lvl9pPr>
+          </a:lstStyle>
+          <a:p>
+            <a:endParaRPr lang="en-US" dirty="0"/>
+          </a:p>
+        </p:txBody>
+      </p:sp>
+      <p:sp>
+        <p:nvSpPr>
+          <p:cNvPr id="6" name="TextBox 5">
+            <a:extLst>
+              <a:ext uri="{FF2B5EF4-FFF2-40B4-BE49-F238E27FC236}">
+                <a16:creationId xmlns:a16="http://schemas.microsoft.com/office/drawing/2014/main" id="{39BE58C1-55EC-AE52-F9EB-EC0B752D6CE0}"/>
+              </a:ext>
+            </a:extLst>
+          </p:cNvPr>
+          <p:cNvSpPr txBox="1"/>
+          <p:nvPr/>
+        </p:nvSpPr>
+        <p:spPr>
+          <a:xfrm>
+            <a:off x="7147035" y="2654956"/>
+            <a:ext cx="1468672" cy="923330"/>
+          </a:xfrm>
+          <a:prstGeom prst="rect">
+            <a:avLst/>
+          </a:prstGeom>
+          <a:noFill/>
+        </p:spPr>
+        <p:txBody>
+          <a:bodyPr wrap="none" rtlCol="0">
+            <a:spAutoFit/>
+          </a:bodyPr>
+          <a:lstStyle/>
+          <a:p>
+            <a:pPr marL="285750" indent="-285750">
+              <a:buFont typeface="Arial" panose="020B0604020202020204" pitchFamily="34" charset="0"/>
+              <a:buChar char="•"/>
+            </a:pPr>
+            <a:r>
+              <a:rPr lang="en-US" dirty="0"/>
+              <a:t>Test List 1</a:t>
+            </a:r>
+          </a:p>
+          <a:p>
+            <a:pPr marL="285750" indent="-285750">
+              <a:buFont typeface="Arial" panose="020B0604020202020204" pitchFamily="34" charset="0"/>
+              <a:buChar char="•"/>
+            </a:pPr>
+            <a:r>
+              <a:rPr lang="en-US" dirty="0"/>
+              <a:t>Test List 2</a:t>
+            </a:r>
+          </a:p>
+          <a:p>
+            <a:pPr marL="285750" indent="-285750">
+              <a:buFont typeface="Arial" panose="020B0604020202020204" pitchFamily="34" charset="0"/>
+              <a:buChar char="•"/>
+            </a:pPr>
+            <a:r>
+              <a:rPr lang="en-US" dirty="0"/>
+              <a:t>Test List 3</a:t>
+            </a:r>
+          </a:p>
+        </p:txBody>
+      </p:sp>
     </p:spTree>
     <p:extLst>
       <p:ext uri="{BB962C8B-B14F-4D97-AF65-F5344CB8AC3E}">
-        <p14:creationId xmlns:p14="http://schemas.microsoft.com/office/powerpoint/2010/main" val="758228969"/>
+        <p14:creationId xmlns:p14="http://schemas.microsoft.com/office/powerpoint/2010/main" val="1098846926"/>
       </p:ext>
     </p:extLst>
   </p:cSld>
@@ -13620,365 +16625,7 @@
 </p:sld>
 </file>
 
-<file path=ppt/slides/slide3.xml><?xml version="1.0" encoding="utf-8"?>
-<p:sld xmlns:a="http://schemas.openxmlformats.org/drawingml/2006/main" xmlns:r="http://schemas.openxmlformats.org/officeDocument/2006/relationships" xmlns:p="http://schemas.openxmlformats.org/presentationml/2006/main">
-  <p:cSld>
-    <p:spTree>
-      <p:nvGrpSpPr>
-        <p:cNvPr id="1" name=""/>
-        <p:cNvGrpSpPr/>
-        <p:nvPr/>
-      </p:nvGrpSpPr>
-      <p:grpSpPr>
-        <a:xfrm>
-          <a:off x="0" y="0"/>
-          <a:ext cx="0" cy="0"/>
-          <a:chOff x="0" y="0"/>
-          <a:chExt cx="0" cy="0"/>
-        </a:xfrm>
-      </p:grpSpPr>
-      <p:sp>
-        <p:nvSpPr>
-          <p:cNvPr id="2" name="Title 1">
-            <a:extLst>
-              <a:ext uri="{FF2B5EF4-FFF2-40B4-BE49-F238E27FC236}">
-                <a16:creationId xmlns:a16="http://schemas.microsoft.com/office/drawing/2014/main" id="{D019DAC9-E390-1FAF-3F5D-5EF68816ED43}"/>
-              </a:ext>
-            </a:extLst>
-          </p:cNvPr>
-          <p:cNvSpPr>
-            <a:spLocks noGrp="1"/>
-          </p:cNvSpPr>
-          <p:nvPr>
-            <p:ph type="title"/>
-          </p:nvPr>
-        </p:nvSpPr>
-        <p:spPr/>
-        <p:txBody>
-          <a:bodyPr/>
-          <a:lstStyle/>
-          <a:p>
-            <a:r>
-              <a:rPr lang="en-US" dirty="0"/>
-              <a:t>Test 2</a:t>
-            </a:r>
-          </a:p>
-        </p:txBody>
-      </p:sp>
-      <p:sp>
-        <p:nvSpPr>
-          <p:cNvPr id="3" name="Content Placeholder 2">
-            <a:extLst>
-              <a:ext uri="{FF2B5EF4-FFF2-40B4-BE49-F238E27FC236}">
-                <a16:creationId xmlns:a16="http://schemas.microsoft.com/office/drawing/2014/main" id="{3AA85613-3D98-A095-A0CA-45C04DE8D069}"/>
-              </a:ext>
-            </a:extLst>
-          </p:cNvPr>
-          <p:cNvSpPr>
-            <a:spLocks noGrp="1"/>
-          </p:cNvSpPr>
-          <p:nvPr>
-            <p:ph idx="1"/>
-          </p:nvPr>
-        </p:nvSpPr>
-        <p:spPr/>
-        <p:txBody>
-          <a:bodyPr/>
-          <a:lstStyle/>
-          <a:p>
-            <a:r>
-              <a:rPr lang="en-US" dirty="0"/>
-              <a:t>Do </a:t>
-            </a:r>
-            <a:r>
-              <a:rPr lang="en-US" dirty="0" err="1"/>
-              <a:t>nostrud</a:t>
-            </a:r>
-            <a:r>
-              <a:rPr lang="en-US" dirty="0"/>
-              <a:t> </a:t>
-            </a:r>
-            <a:r>
-              <a:rPr lang="en-US" dirty="0" err="1"/>
-              <a:t>elit</a:t>
-            </a:r>
-            <a:r>
-              <a:rPr lang="en-US" dirty="0"/>
-              <a:t> </a:t>
-            </a:r>
-            <a:r>
-              <a:rPr lang="en-US" dirty="0" err="1"/>
-              <a:t>ullamco</a:t>
-            </a:r>
-            <a:r>
-              <a:rPr lang="en-US" dirty="0"/>
-              <a:t> </a:t>
-            </a:r>
-            <a:r>
-              <a:rPr lang="en-US" dirty="0" err="1"/>
-              <a:t>quis</a:t>
-            </a:r>
-            <a:r>
-              <a:rPr lang="en-US" dirty="0"/>
-              <a:t> </a:t>
-            </a:r>
-            <a:r>
-              <a:rPr lang="en-US" dirty="0" err="1"/>
-              <a:t>anim</a:t>
-            </a:r>
-            <a:r>
-              <a:rPr lang="en-US" dirty="0"/>
-              <a:t> </a:t>
-            </a:r>
-            <a:r>
-              <a:rPr lang="en-US" dirty="0" err="1"/>
-              <a:t>eiusmod</a:t>
-            </a:r>
-            <a:r>
-              <a:rPr lang="en-US" dirty="0"/>
-              <a:t> </a:t>
-            </a:r>
-            <a:r>
-              <a:rPr lang="en-US" dirty="0" err="1"/>
-              <a:t>aute</a:t>
-            </a:r>
-            <a:r>
-              <a:rPr lang="en-US" dirty="0"/>
-              <a:t> </a:t>
-            </a:r>
-            <a:r>
-              <a:rPr lang="en-US" dirty="0" err="1"/>
-              <a:t>pariatur</a:t>
-            </a:r>
-            <a:r>
-              <a:rPr lang="en-US" dirty="0"/>
-              <a:t> </a:t>
-            </a:r>
-            <a:r>
-              <a:rPr lang="en-US" dirty="0" err="1"/>
-              <a:t>excepteur</a:t>
-            </a:r>
-            <a:r>
-              <a:rPr lang="en-US" dirty="0"/>
-              <a:t> </a:t>
-            </a:r>
-            <a:r>
-              <a:rPr lang="en-US" dirty="0" err="1"/>
-              <a:t>tempor</a:t>
-            </a:r>
-            <a:r>
-              <a:rPr lang="en-US" dirty="0"/>
-              <a:t> Lorem </a:t>
-            </a:r>
-            <a:r>
-              <a:rPr lang="en-US" dirty="0" err="1"/>
-              <a:t>proident</a:t>
-            </a:r>
-            <a:r>
-              <a:rPr lang="en-US" dirty="0"/>
-              <a:t> </a:t>
-            </a:r>
-            <a:r>
-              <a:rPr lang="en-US" dirty="0" err="1"/>
-              <a:t>est</a:t>
-            </a:r>
-            <a:r>
-              <a:rPr lang="en-US" dirty="0"/>
-              <a:t> </a:t>
-            </a:r>
-            <a:r>
-              <a:rPr lang="en-US" dirty="0" err="1"/>
-              <a:t>laborum</a:t>
-            </a:r>
-            <a:r>
-              <a:rPr lang="en-US" dirty="0"/>
-              <a:t>. </a:t>
-            </a:r>
-            <a:r>
-              <a:rPr lang="en-US" dirty="0" err="1"/>
-              <a:t>Laboris</a:t>
-            </a:r>
-            <a:r>
-              <a:rPr lang="en-US" dirty="0"/>
-              <a:t> labore </a:t>
-            </a:r>
-            <a:r>
-              <a:rPr lang="en-US" dirty="0" err="1"/>
-              <a:t>ullamco</a:t>
-            </a:r>
-            <a:r>
-              <a:rPr lang="en-US" dirty="0"/>
-              <a:t> ad ipsum minim </a:t>
-            </a:r>
-            <a:r>
-              <a:rPr lang="en-US" dirty="0" err="1"/>
-              <a:t>esse</a:t>
-            </a:r>
-            <a:r>
-              <a:rPr lang="en-US" dirty="0"/>
-              <a:t> </a:t>
-            </a:r>
-            <a:r>
-              <a:rPr lang="en-US" dirty="0" err="1"/>
-              <a:t>cupidatat</a:t>
-            </a:r>
-            <a:r>
-              <a:rPr lang="en-US" dirty="0"/>
-              <a:t> </a:t>
-            </a:r>
-            <a:r>
-              <a:rPr lang="en-US" dirty="0" err="1"/>
-              <a:t>ut</a:t>
-            </a:r>
-            <a:r>
-              <a:rPr lang="en-US" dirty="0"/>
-              <a:t> </a:t>
-            </a:r>
-            <a:r>
-              <a:rPr lang="en-US" dirty="0" err="1"/>
-              <a:t>aliquip</a:t>
-            </a:r>
-            <a:r>
-              <a:rPr lang="en-US" dirty="0"/>
-              <a:t> ex minim. </a:t>
-            </a:r>
-            <a:r>
-              <a:rPr lang="en-US" dirty="0" err="1"/>
-              <a:t>Deserunt</a:t>
-            </a:r>
-            <a:r>
-              <a:rPr lang="en-US" dirty="0"/>
-              <a:t> ex </a:t>
-            </a:r>
-            <a:r>
-              <a:rPr lang="en-US" dirty="0" err="1"/>
-              <a:t>pariatur</a:t>
-            </a:r>
-            <a:r>
-              <a:rPr lang="en-US" dirty="0"/>
-              <a:t> </a:t>
-            </a:r>
-            <a:r>
-              <a:rPr lang="en-US" dirty="0" err="1"/>
-              <a:t>fugiat</a:t>
-            </a:r>
-            <a:r>
-              <a:rPr lang="en-US" dirty="0"/>
-              <a:t> ad </a:t>
-            </a:r>
-            <a:r>
-              <a:rPr lang="en-US" dirty="0" err="1"/>
-              <a:t>ullamco</a:t>
-            </a:r>
-            <a:r>
-              <a:rPr lang="en-US" dirty="0"/>
-              <a:t> ipsum </a:t>
-            </a:r>
-            <a:r>
-              <a:rPr lang="en-US" dirty="0" err="1"/>
-              <a:t>eiusmod</a:t>
-            </a:r>
-            <a:r>
-              <a:rPr lang="en-US" dirty="0"/>
-              <a:t> </a:t>
-            </a:r>
-            <a:r>
-              <a:rPr lang="en-US" dirty="0" err="1"/>
-              <a:t>est</a:t>
-            </a:r>
-            <a:r>
-              <a:rPr lang="en-US" dirty="0"/>
-              <a:t> in </a:t>
-            </a:r>
-            <a:r>
-              <a:rPr lang="en-US" dirty="0" err="1"/>
-              <a:t>est</a:t>
-            </a:r>
-            <a:r>
-              <a:rPr lang="en-US" dirty="0"/>
-              <a:t> </a:t>
-            </a:r>
-            <a:r>
-              <a:rPr lang="en-US" dirty="0" err="1"/>
-              <a:t>aliquip</a:t>
-            </a:r>
-            <a:r>
-              <a:rPr lang="en-US" dirty="0"/>
-              <a:t> dolore minim </a:t>
-            </a:r>
-            <a:r>
-              <a:rPr lang="en-US" dirty="0" err="1"/>
-              <a:t>cillum</a:t>
-            </a:r>
-            <a:r>
-              <a:rPr lang="en-US" dirty="0"/>
-              <a:t> </a:t>
-            </a:r>
-            <a:r>
-              <a:rPr lang="en-US" dirty="0" err="1"/>
-              <a:t>laborum</a:t>
-            </a:r>
-            <a:r>
-              <a:rPr lang="en-US" dirty="0"/>
-              <a:t>. </a:t>
-            </a:r>
-            <a:r>
-              <a:rPr lang="en-US" dirty="0" err="1"/>
-              <a:t>Nostrud</a:t>
-            </a:r>
-            <a:r>
-              <a:rPr lang="en-US" dirty="0"/>
-              <a:t> ex </a:t>
-            </a:r>
-            <a:r>
-              <a:rPr lang="en-US" dirty="0" err="1"/>
-              <a:t>deserunt</a:t>
-            </a:r>
-            <a:r>
-              <a:rPr lang="en-US" dirty="0"/>
-              <a:t> magna </a:t>
-            </a:r>
-            <a:r>
-              <a:rPr lang="en-US" dirty="0" err="1"/>
-              <a:t>commodo</a:t>
-            </a:r>
-            <a:r>
-              <a:rPr lang="en-US" dirty="0"/>
-              <a:t> </a:t>
-            </a:r>
-            <a:r>
-              <a:rPr lang="en-US" dirty="0" err="1"/>
-              <a:t>amet</a:t>
-            </a:r>
-            <a:r>
-              <a:rPr lang="en-US" dirty="0"/>
-              <a:t> </a:t>
-            </a:r>
-            <a:r>
-              <a:rPr lang="en-US" dirty="0" err="1"/>
-              <a:t>consectetur</a:t>
-            </a:r>
-            <a:r>
-              <a:rPr lang="en-US" dirty="0"/>
-              <a:t>.</a:t>
-            </a:r>
-          </a:p>
-        </p:txBody>
-      </p:sp>
-    </p:spTree>
-    <p:extLst>
-      <p:ext uri="{BB962C8B-B14F-4D97-AF65-F5344CB8AC3E}">
-        <p14:creationId xmlns:p14="http://schemas.microsoft.com/office/powerpoint/2010/main" val="3696062338"/>
-      </p:ext>
-    </p:extLst>
-  </p:cSld>
-  <p:clrMapOvr>
-    <a:masterClrMapping/>
-  </p:clrMapOvr>
-</p:sld>
-</file>
-
-<file path=ppt/slides/slide4.xml><?xml version="1.0" encoding="utf-8"?>
+<file path=ppt/slides/slide5.xml><?xml version="1.0" encoding="utf-8"?>
 <p:sld xmlns:a="http://schemas.openxmlformats.org/drawingml/2006/main" xmlns:r="http://schemas.openxmlformats.org/officeDocument/2006/relationships" xmlns:p="http://schemas.openxmlformats.org/presentationml/2006/main">
   <p:cSld>
     <p:spTree>
@@ -14018,318 +16665,594 @@
           <a:p>
             <a:r>
               <a:rPr lang="en-US" dirty="0"/>
-              <a:t>Test 3</a:t>
+              <a:t>Page with Charts</a:t>
             </a:r>
+          </a:p>
+        </p:txBody>
+      </p:sp>
+      <p:graphicFrame>
+        <p:nvGraphicFramePr>
+          <p:cNvPr id="7" name="Content Placeholder 6">
+            <a:extLst>
+              <a:ext uri="{FF2B5EF4-FFF2-40B4-BE49-F238E27FC236}">
+                <a16:creationId xmlns:a16="http://schemas.microsoft.com/office/drawing/2014/main" id="{F9442BDC-15E4-73FB-4D41-0B777CBEE8A7}"/>
+              </a:ext>
+            </a:extLst>
+          </p:cNvPr>
+          <p:cNvGraphicFramePr>
+            <a:graphicFrameLocks noGrp="1"/>
+          </p:cNvGraphicFramePr>
+          <p:nvPr>
+            <p:ph idx="1"/>
+            <p:extLst>
+              <p:ext uri="{D42A27DB-BD31-4B8C-83A1-F6EECF244321}">
+                <p14:modId xmlns:p14="http://schemas.microsoft.com/office/powerpoint/2010/main" val="3006701296"/>
+              </p:ext>
+            </p:extLst>
+          </p:nvPr>
+        </p:nvGraphicFramePr>
+        <p:xfrm>
+          <a:off x="1081088" y="2565400"/>
+          <a:ext cx="4364037" cy="3319463"/>
+        </p:xfrm>
+        <a:graphic>
+          <a:graphicData uri="http://schemas.openxmlformats.org/drawingml/2006/chart">
+            <c:chart xmlns:c="http://schemas.openxmlformats.org/drawingml/2006/chart" xmlns:r="http://schemas.openxmlformats.org/officeDocument/2006/relationships" r:id="rId2"/>
+          </a:graphicData>
+        </a:graphic>
+      </p:graphicFrame>
+      <p:sp>
+        <p:nvSpPr>
+          <p:cNvPr id="4" name="Content Placeholder 2">
+            <a:extLst>
+              <a:ext uri="{FF2B5EF4-FFF2-40B4-BE49-F238E27FC236}">
+                <a16:creationId xmlns:a16="http://schemas.microsoft.com/office/drawing/2014/main" id="{1FCAC631-3B0E-A855-334F-6FE429B62DB7}"/>
+              </a:ext>
+            </a:extLst>
+          </p:cNvPr>
+          <p:cNvSpPr txBox="1">
+            <a:spLocks/>
+          </p:cNvSpPr>
+          <p:nvPr/>
+        </p:nvSpPr>
+        <p:spPr>
+          <a:xfrm>
+            <a:off x="6096000" y="2654956"/>
+            <a:ext cx="4362977" cy="3318713"/>
+          </a:xfrm>
+          <a:prstGeom prst="rect">
+            <a:avLst/>
+          </a:prstGeom>
+        </p:spPr>
+        <p:txBody>
+          <a:bodyPr vert="horz" lIns="91440" tIns="45720" rIns="91440" bIns="45720" rtlCol="0">
+            <a:normAutofit/>
+          </a:bodyPr>
+          <a:lstStyle>
+            <a:lvl1pPr marL="342900" indent="-342900" algn="l" defTabSz="457200" rtl="0" eaLnBrk="1" latinLnBrk="0" hangingPunct="1">
+              <a:spcBef>
+                <a:spcPts val="1000"/>
+              </a:spcBef>
+              <a:spcAft>
+                <a:spcPts val="0"/>
+              </a:spcAft>
+              <a:buClr>
+                <a:schemeClr val="accent1"/>
+              </a:buClr>
+              <a:buSzPct val="80000"/>
+              <a:buFont typeface="Wingdings 3" charset="2"/>
+              <a:buChar char=""/>
+              <a:defRPr sz="1800" b="0" i="0" kern="1200">
+                <a:solidFill>
+                  <a:schemeClr val="tx1">
+                    <a:lumMod val="75000"/>
+                    <a:lumOff val="25000"/>
+                  </a:schemeClr>
+                </a:solidFill>
+                <a:latin typeface="+mn-lt"/>
+                <a:ea typeface="+mn-ea"/>
+                <a:cs typeface="+mn-cs"/>
+              </a:defRPr>
+            </a:lvl1pPr>
+            <a:lvl2pPr marL="742950" indent="-285750" algn="l" defTabSz="457200" rtl="0" eaLnBrk="1" latinLnBrk="0" hangingPunct="1">
+              <a:spcBef>
+                <a:spcPts val="1000"/>
+              </a:spcBef>
+              <a:spcAft>
+                <a:spcPts val="0"/>
+              </a:spcAft>
+              <a:buClr>
+                <a:schemeClr val="accent1"/>
+              </a:buClr>
+              <a:buSzPct val="80000"/>
+              <a:buFont typeface="Wingdings 3" charset="2"/>
+              <a:buChar char=""/>
+              <a:defRPr sz="1600" b="0" i="0" kern="1200">
+                <a:solidFill>
+                  <a:schemeClr val="tx1">
+                    <a:lumMod val="75000"/>
+                    <a:lumOff val="25000"/>
+                  </a:schemeClr>
+                </a:solidFill>
+                <a:latin typeface="+mn-lt"/>
+                <a:ea typeface="+mn-ea"/>
+                <a:cs typeface="+mn-cs"/>
+              </a:defRPr>
+            </a:lvl2pPr>
+            <a:lvl3pPr marL="1143000" indent="-228600" algn="l" defTabSz="457200" rtl="0" eaLnBrk="1" latinLnBrk="0" hangingPunct="1">
+              <a:spcBef>
+                <a:spcPts val="1000"/>
+              </a:spcBef>
+              <a:spcAft>
+                <a:spcPts val="0"/>
+              </a:spcAft>
+              <a:buClr>
+                <a:schemeClr val="accent1"/>
+              </a:buClr>
+              <a:buSzPct val="80000"/>
+              <a:buFont typeface="Wingdings 3" charset="2"/>
+              <a:buChar char=""/>
+              <a:defRPr sz="1400" b="0" i="0" kern="1200">
+                <a:solidFill>
+                  <a:schemeClr val="tx1">
+                    <a:lumMod val="75000"/>
+                    <a:lumOff val="25000"/>
+                  </a:schemeClr>
+                </a:solidFill>
+                <a:latin typeface="+mn-lt"/>
+                <a:ea typeface="+mn-ea"/>
+                <a:cs typeface="+mn-cs"/>
+              </a:defRPr>
+            </a:lvl3pPr>
+            <a:lvl4pPr marL="1600200" indent="-228600" algn="l" defTabSz="457200" rtl="0" eaLnBrk="1" latinLnBrk="0" hangingPunct="1">
+              <a:spcBef>
+                <a:spcPts val="1000"/>
+              </a:spcBef>
+              <a:spcAft>
+                <a:spcPts val="0"/>
+              </a:spcAft>
+              <a:buClr>
+                <a:schemeClr val="accent1"/>
+              </a:buClr>
+              <a:buSzPct val="80000"/>
+              <a:buFont typeface="Wingdings 3" charset="2"/>
+              <a:buChar char=""/>
+              <a:defRPr sz="1200" b="0" i="0" kern="1200">
+                <a:solidFill>
+                  <a:schemeClr val="tx1">
+                    <a:lumMod val="75000"/>
+                    <a:lumOff val="25000"/>
+                  </a:schemeClr>
+                </a:solidFill>
+                <a:latin typeface="+mn-lt"/>
+                <a:ea typeface="+mn-ea"/>
+                <a:cs typeface="+mn-cs"/>
+              </a:defRPr>
+            </a:lvl4pPr>
+            <a:lvl5pPr marL="2057400" indent="-228600" algn="l" defTabSz="457200" rtl="0" eaLnBrk="1" latinLnBrk="0" hangingPunct="1">
+              <a:spcBef>
+                <a:spcPts val="1000"/>
+              </a:spcBef>
+              <a:spcAft>
+                <a:spcPts val="0"/>
+              </a:spcAft>
+              <a:buClr>
+                <a:schemeClr val="accent1"/>
+              </a:buClr>
+              <a:buSzPct val="80000"/>
+              <a:buFont typeface="Wingdings 3" charset="2"/>
+              <a:buChar char=""/>
+              <a:defRPr sz="1200" b="0" i="0" kern="1200">
+                <a:solidFill>
+                  <a:schemeClr val="tx1">
+                    <a:lumMod val="75000"/>
+                    <a:lumOff val="25000"/>
+                  </a:schemeClr>
+                </a:solidFill>
+                <a:latin typeface="+mn-lt"/>
+                <a:ea typeface="+mn-ea"/>
+                <a:cs typeface="+mn-cs"/>
+              </a:defRPr>
+            </a:lvl5pPr>
+            <a:lvl6pPr marL="2514600" indent="-228600" algn="l" defTabSz="457200" rtl="0" eaLnBrk="1" latinLnBrk="0" hangingPunct="1">
+              <a:spcBef>
+                <a:spcPts val="1000"/>
+              </a:spcBef>
+              <a:spcAft>
+                <a:spcPts val="0"/>
+              </a:spcAft>
+              <a:buClr>
+                <a:schemeClr val="accent1"/>
+              </a:buClr>
+              <a:buSzPct val="80000"/>
+              <a:buFont typeface="Wingdings 3" charset="2"/>
+              <a:buChar char=""/>
+              <a:defRPr sz="1200" b="0" i="0" kern="1200">
+                <a:solidFill>
+                  <a:schemeClr val="tx1">
+                    <a:lumMod val="75000"/>
+                    <a:lumOff val="25000"/>
+                  </a:schemeClr>
+                </a:solidFill>
+                <a:latin typeface="+mn-lt"/>
+                <a:ea typeface="+mn-ea"/>
+                <a:cs typeface="+mn-cs"/>
+              </a:defRPr>
+            </a:lvl6pPr>
+            <a:lvl7pPr marL="2971800" indent="-228600" algn="l" defTabSz="457200" rtl="0" eaLnBrk="1" latinLnBrk="0" hangingPunct="1">
+              <a:spcBef>
+                <a:spcPts val="1000"/>
+              </a:spcBef>
+              <a:spcAft>
+                <a:spcPts val="0"/>
+              </a:spcAft>
+              <a:buClr>
+                <a:schemeClr val="accent1"/>
+              </a:buClr>
+              <a:buSzPct val="80000"/>
+              <a:buFont typeface="Wingdings 3" charset="2"/>
+              <a:buChar char=""/>
+              <a:defRPr sz="1200" b="0" i="0" kern="1200">
+                <a:solidFill>
+                  <a:schemeClr val="tx1">
+                    <a:lumMod val="75000"/>
+                    <a:lumOff val="25000"/>
+                  </a:schemeClr>
+                </a:solidFill>
+                <a:latin typeface="+mn-lt"/>
+                <a:ea typeface="+mn-ea"/>
+                <a:cs typeface="+mn-cs"/>
+              </a:defRPr>
+            </a:lvl7pPr>
+            <a:lvl8pPr marL="3429000" indent="-228600" algn="l" defTabSz="457200" rtl="0" eaLnBrk="1" latinLnBrk="0" hangingPunct="1">
+              <a:spcBef>
+                <a:spcPts val="1000"/>
+              </a:spcBef>
+              <a:spcAft>
+                <a:spcPts val="0"/>
+              </a:spcAft>
+              <a:buClr>
+                <a:schemeClr val="accent1"/>
+              </a:buClr>
+              <a:buSzPct val="80000"/>
+              <a:buFont typeface="Wingdings 3" charset="2"/>
+              <a:buChar char=""/>
+              <a:defRPr sz="1200" b="0" i="0" kern="1200">
+                <a:solidFill>
+                  <a:schemeClr val="tx1">
+                    <a:lumMod val="75000"/>
+                    <a:lumOff val="25000"/>
+                  </a:schemeClr>
+                </a:solidFill>
+                <a:latin typeface="+mn-lt"/>
+                <a:ea typeface="+mn-ea"/>
+                <a:cs typeface="+mn-cs"/>
+              </a:defRPr>
+            </a:lvl8pPr>
+            <a:lvl9pPr marL="3886200" indent="-228600" algn="l" defTabSz="457200" rtl="0" eaLnBrk="1" latinLnBrk="0" hangingPunct="1">
+              <a:spcBef>
+                <a:spcPts val="1000"/>
+              </a:spcBef>
+              <a:spcAft>
+                <a:spcPts val="0"/>
+              </a:spcAft>
+              <a:buClr>
+                <a:schemeClr val="accent1"/>
+              </a:buClr>
+              <a:buSzPct val="80000"/>
+              <a:buFont typeface="Wingdings 3" charset="2"/>
+              <a:buChar char=""/>
+              <a:defRPr sz="1200" b="0" i="0" kern="1200">
+                <a:solidFill>
+                  <a:schemeClr val="tx1">
+                    <a:lumMod val="75000"/>
+                    <a:lumOff val="25000"/>
+                  </a:schemeClr>
+                </a:solidFill>
+                <a:latin typeface="+mn-lt"/>
+                <a:ea typeface="+mn-ea"/>
+                <a:cs typeface="+mn-cs"/>
+              </a:defRPr>
+            </a:lvl9pPr>
+          </a:lstStyle>
+          <a:p>
+            <a:endParaRPr lang="en-US" dirty="0"/>
           </a:p>
         </p:txBody>
       </p:sp>
       <p:sp>
         <p:nvSpPr>
-          <p:cNvPr id="3" name="Content Placeholder 2">
+          <p:cNvPr id="5" name="Content Placeholder 2">
             <a:extLst>
               <a:ext uri="{FF2B5EF4-FFF2-40B4-BE49-F238E27FC236}">
-                <a16:creationId xmlns:a16="http://schemas.microsoft.com/office/drawing/2014/main" id="{9B007A68-D600-93DE-6A82-2C1804A07300}"/>
+                <a16:creationId xmlns:a16="http://schemas.microsoft.com/office/drawing/2014/main" id="{97BF2D6C-FE01-1E9B-EBA3-6695D476879A}"/>
               </a:ext>
             </a:extLst>
           </p:cNvPr>
-          <p:cNvSpPr>
-            <a:spLocks noGrp="1"/>
+          <p:cNvSpPr txBox="1">
+            <a:spLocks/>
           </p:cNvSpPr>
-          <p:nvPr>
-            <p:ph idx="1"/>
-          </p:nvPr>
+          <p:nvPr/>
         </p:nvSpPr>
-        <p:spPr/>
+        <p:spPr>
+          <a:xfrm>
+            <a:off x="6095999" y="2565618"/>
+            <a:ext cx="4362977" cy="3318713"/>
+          </a:xfrm>
+          <a:prstGeom prst="rect">
+            <a:avLst/>
+          </a:prstGeom>
+        </p:spPr>
         <p:txBody>
-          <a:bodyPr/>
-          <a:lstStyle/>
-          <a:p>
-            <a:r>
-              <a:rPr lang="en-US" dirty="0"/>
-              <a:t>Do </a:t>
-            </a:r>
-            <a:r>
-              <a:rPr lang="en-US" dirty="0" err="1"/>
-              <a:t>nostrud</a:t>
-            </a:r>
-            <a:r>
-              <a:rPr lang="en-US" dirty="0"/>
-              <a:t> </a:t>
-            </a:r>
-            <a:r>
-              <a:rPr lang="en-US" dirty="0" err="1"/>
-              <a:t>elit</a:t>
-            </a:r>
-            <a:r>
-              <a:rPr lang="en-US" dirty="0"/>
-              <a:t> </a:t>
-            </a:r>
-            <a:r>
-              <a:rPr lang="en-US" dirty="0" err="1"/>
-              <a:t>ullamco</a:t>
-            </a:r>
-            <a:r>
-              <a:rPr lang="en-US" dirty="0"/>
-              <a:t> </a:t>
-            </a:r>
-            <a:r>
-              <a:rPr lang="en-US" dirty="0" err="1"/>
-              <a:t>quis</a:t>
-            </a:r>
-            <a:r>
-              <a:rPr lang="en-US" dirty="0"/>
-              <a:t> </a:t>
-            </a:r>
-            <a:r>
-              <a:rPr lang="en-US" dirty="0" err="1"/>
-              <a:t>anim</a:t>
-            </a:r>
-            <a:r>
-              <a:rPr lang="en-US" dirty="0"/>
-              <a:t> </a:t>
-            </a:r>
-            <a:r>
-              <a:rPr lang="en-US" dirty="0" err="1"/>
-              <a:t>eiusmod</a:t>
-            </a:r>
-            <a:r>
-              <a:rPr lang="en-US" dirty="0"/>
-              <a:t> </a:t>
-            </a:r>
-            <a:r>
-              <a:rPr lang="en-US" dirty="0" err="1"/>
-              <a:t>aute</a:t>
-            </a:r>
-            <a:r>
-              <a:rPr lang="en-US" dirty="0"/>
-              <a:t> </a:t>
-            </a:r>
-            <a:r>
-              <a:rPr lang="en-US" dirty="0" err="1"/>
-              <a:t>pariatur</a:t>
-            </a:r>
-            <a:r>
-              <a:rPr lang="en-US" dirty="0"/>
-              <a:t> </a:t>
-            </a:r>
-            <a:r>
-              <a:rPr lang="en-US" dirty="0" err="1"/>
-              <a:t>excepteur</a:t>
-            </a:r>
-            <a:r>
-              <a:rPr lang="en-US" dirty="0"/>
-              <a:t> </a:t>
-            </a:r>
-            <a:r>
-              <a:rPr lang="en-US" dirty="0" err="1"/>
-              <a:t>tempor</a:t>
-            </a:r>
-            <a:r>
-              <a:rPr lang="en-US" dirty="0"/>
-              <a:t> Lorem </a:t>
-            </a:r>
-            <a:r>
-              <a:rPr lang="en-US" dirty="0" err="1"/>
-              <a:t>proident</a:t>
-            </a:r>
-            <a:r>
-              <a:rPr lang="en-US" dirty="0"/>
-              <a:t> </a:t>
-            </a:r>
-            <a:r>
-              <a:rPr lang="en-US" dirty="0" err="1"/>
-              <a:t>est</a:t>
-            </a:r>
-            <a:r>
-              <a:rPr lang="en-US" dirty="0"/>
-              <a:t> </a:t>
-            </a:r>
-            <a:r>
-              <a:rPr lang="en-US" dirty="0" err="1"/>
-              <a:t>laborum</a:t>
-            </a:r>
-            <a:r>
-              <a:rPr lang="en-US" dirty="0"/>
-              <a:t>. </a:t>
-            </a:r>
-            <a:r>
-              <a:rPr lang="en-US" dirty="0" err="1"/>
-              <a:t>Laboris</a:t>
-            </a:r>
-            <a:r>
-              <a:rPr lang="en-US" dirty="0"/>
-              <a:t> labore </a:t>
-            </a:r>
-            <a:r>
-              <a:rPr lang="en-US" dirty="0" err="1"/>
-              <a:t>ullamco</a:t>
-            </a:r>
-            <a:r>
-              <a:rPr lang="en-US" dirty="0"/>
-              <a:t> ad ipsum minim </a:t>
-            </a:r>
-            <a:r>
-              <a:rPr lang="en-US" dirty="0" err="1"/>
-              <a:t>esse</a:t>
-            </a:r>
-            <a:r>
-              <a:rPr lang="en-US" dirty="0"/>
-              <a:t> </a:t>
-            </a:r>
-            <a:r>
-              <a:rPr lang="en-US" dirty="0" err="1"/>
-              <a:t>cupidatat</a:t>
-            </a:r>
-            <a:r>
-              <a:rPr lang="en-US" dirty="0"/>
-              <a:t> </a:t>
-            </a:r>
-            <a:r>
-              <a:rPr lang="en-US" dirty="0" err="1"/>
-              <a:t>ut</a:t>
-            </a:r>
-            <a:r>
-              <a:rPr lang="en-US" dirty="0"/>
-              <a:t> </a:t>
-            </a:r>
-            <a:r>
-              <a:rPr lang="en-US" dirty="0" err="1"/>
-              <a:t>aliquip</a:t>
-            </a:r>
-            <a:r>
-              <a:rPr lang="en-US" dirty="0"/>
-              <a:t> ex minim. </a:t>
-            </a:r>
-            <a:r>
-              <a:rPr lang="en-US" dirty="0" err="1"/>
-              <a:t>Deserunt</a:t>
-            </a:r>
-            <a:r>
-              <a:rPr lang="en-US" dirty="0"/>
-              <a:t> ex </a:t>
-            </a:r>
-            <a:r>
-              <a:rPr lang="en-US" dirty="0" err="1"/>
-              <a:t>pariatur</a:t>
-            </a:r>
-            <a:r>
-              <a:rPr lang="en-US" dirty="0"/>
-              <a:t> </a:t>
-            </a:r>
-            <a:r>
-              <a:rPr lang="en-US" dirty="0" err="1"/>
-              <a:t>fugiat</a:t>
-            </a:r>
-            <a:r>
-              <a:rPr lang="en-US" dirty="0"/>
-              <a:t> ad </a:t>
-            </a:r>
-            <a:r>
-              <a:rPr lang="en-US" dirty="0" err="1"/>
-              <a:t>ullamco</a:t>
-            </a:r>
-            <a:r>
-              <a:rPr lang="en-US" dirty="0"/>
-              <a:t> ipsum </a:t>
-            </a:r>
-            <a:r>
-              <a:rPr lang="en-US" dirty="0" err="1"/>
-              <a:t>eiusmod</a:t>
-            </a:r>
-            <a:r>
-              <a:rPr lang="en-US" dirty="0"/>
-              <a:t> </a:t>
-            </a:r>
-            <a:r>
-              <a:rPr lang="en-US" dirty="0" err="1"/>
-              <a:t>est</a:t>
-            </a:r>
-            <a:r>
-              <a:rPr lang="en-US" dirty="0"/>
-              <a:t> in </a:t>
-            </a:r>
-            <a:r>
-              <a:rPr lang="en-US" dirty="0" err="1"/>
-              <a:t>est</a:t>
-            </a:r>
-            <a:r>
-              <a:rPr lang="en-US" dirty="0"/>
-              <a:t> </a:t>
-            </a:r>
-            <a:r>
-              <a:rPr lang="en-US" dirty="0" err="1"/>
-              <a:t>aliquip</a:t>
-            </a:r>
-            <a:r>
-              <a:rPr lang="en-US" dirty="0"/>
-              <a:t> dolore minim </a:t>
-            </a:r>
-            <a:r>
-              <a:rPr lang="en-US" dirty="0" err="1"/>
-              <a:t>cillum</a:t>
-            </a:r>
-            <a:r>
-              <a:rPr lang="en-US" dirty="0"/>
-              <a:t> </a:t>
-            </a:r>
-            <a:r>
-              <a:rPr lang="en-US" dirty="0" err="1"/>
-              <a:t>laborum</a:t>
-            </a:r>
-            <a:r>
-              <a:rPr lang="en-US" dirty="0"/>
-              <a:t>. </a:t>
-            </a:r>
-            <a:r>
-              <a:rPr lang="en-US" dirty="0" err="1"/>
-              <a:t>Nostrud</a:t>
-            </a:r>
-            <a:r>
-              <a:rPr lang="en-US" dirty="0"/>
-              <a:t> ex </a:t>
-            </a:r>
-            <a:r>
-              <a:rPr lang="en-US" dirty="0" err="1"/>
-              <a:t>deserunt</a:t>
-            </a:r>
-            <a:r>
-              <a:rPr lang="en-US" dirty="0"/>
-              <a:t> magna </a:t>
-            </a:r>
-            <a:r>
-              <a:rPr lang="en-US" dirty="0" err="1"/>
-              <a:t>commodo</a:t>
-            </a:r>
-            <a:r>
-              <a:rPr lang="en-US" dirty="0"/>
-              <a:t> </a:t>
-            </a:r>
-            <a:r>
-              <a:rPr lang="en-US" dirty="0" err="1"/>
-              <a:t>amet</a:t>
-            </a:r>
-            <a:r>
-              <a:rPr lang="en-US" dirty="0"/>
-              <a:t> </a:t>
-            </a:r>
-            <a:r>
-              <a:rPr lang="en-US" dirty="0" err="1"/>
-              <a:t>consectetur</a:t>
-            </a:r>
-            <a:r>
-              <a:rPr lang="en-US" dirty="0"/>
-              <a:t>.</a:t>
-            </a:r>
-          </a:p>
+          <a:bodyPr vert="horz" lIns="91440" tIns="45720" rIns="91440" bIns="45720" rtlCol="0">
+            <a:normAutofit/>
+          </a:bodyPr>
+          <a:lstStyle>
+            <a:lvl1pPr marL="342900" indent="-342900" algn="l" defTabSz="457200" rtl="0" eaLnBrk="1" latinLnBrk="0" hangingPunct="1">
+              <a:spcBef>
+                <a:spcPts val="1000"/>
+              </a:spcBef>
+              <a:spcAft>
+                <a:spcPts val="0"/>
+              </a:spcAft>
+              <a:buClr>
+                <a:schemeClr val="accent1"/>
+              </a:buClr>
+              <a:buSzPct val="80000"/>
+              <a:buFont typeface="Wingdings 3" charset="2"/>
+              <a:buChar char=""/>
+              <a:defRPr sz="1800" b="0" i="0" kern="1200">
+                <a:solidFill>
+                  <a:schemeClr val="tx1">
+                    <a:lumMod val="75000"/>
+                    <a:lumOff val="25000"/>
+                  </a:schemeClr>
+                </a:solidFill>
+                <a:latin typeface="+mn-lt"/>
+                <a:ea typeface="+mn-ea"/>
+                <a:cs typeface="+mn-cs"/>
+              </a:defRPr>
+            </a:lvl1pPr>
+            <a:lvl2pPr marL="742950" indent="-285750" algn="l" defTabSz="457200" rtl="0" eaLnBrk="1" latinLnBrk="0" hangingPunct="1">
+              <a:spcBef>
+                <a:spcPts val="1000"/>
+              </a:spcBef>
+              <a:spcAft>
+                <a:spcPts val="0"/>
+              </a:spcAft>
+              <a:buClr>
+                <a:schemeClr val="accent1"/>
+              </a:buClr>
+              <a:buSzPct val="80000"/>
+              <a:buFont typeface="Wingdings 3" charset="2"/>
+              <a:buChar char=""/>
+              <a:defRPr sz="1600" b="0" i="0" kern="1200">
+                <a:solidFill>
+                  <a:schemeClr val="tx1">
+                    <a:lumMod val="75000"/>
+                    <a:lumOff val="25000"/>
+                  </a:schemeClr>
+                </a:solidFill>
+                <a:latin typeface="+mn-lt"/>
+                <a:ea typeface="+mn-ea"/>
+                <a:cs typeface="+mn-cs"/>
+              </a:defRPr>
+            </a:lvl2pPr>
+            <a:lvl3pPr marL="1143000" indent="-228600" algn="l" defTabSz="457200" rtl="0" eaLnBrk="1" latinLnBrk="0" hangingPunct="1">
+              <a:spcBef>
+                <a:spcPts val="1000"/>
+              </a:spcBef>
+              <a:spcAft>
+                <a:spcPts val="0"/>
+              </a:spcAft>
+              <a:buClr>
+                <a:schemeClr val="accent1"/>
+              </a:buClr>
+              <a:buSzPct val="80000"/>
+              <a:buFont typeface="Wingdings 3" charset="2"/>
+              <a:buChar char=""/>
+              <a:defRPr sz="1400" b="0" i="0" kern="1200">
+                <a:solidFill>
+                  <a:schemeClr val="tx1">
+                    <a:lumMod val="75000"/>
+                    <a:lumOff val="25000"/>
+                  </a:schemeClr>
+                </a:solidFill>
+                <a:latin typeface="+mn-lt"/>
+                <a:ea typeface="+mn-ea"/>
+                <a:cs typeface="+mn-cs"/>
+              </a:defRPr>
+            </a:lvl3pPr>
+            <a:lvl4pPr marL="1600200" indent="-228600" algn="l" defTabSz="457200" rtl="0" eaLnBrk="1" latinLnBrk="0" hangingPunct="1">
+              <a:spcBef>
+                <a:spcPts val="1000"/>
+              </a:spcBef>
+              <a:spcAft>
+                <a:spcPts val="0"/>
+              </a:spcAft>
+              <a:buClr>
+                <a:schemeClr val="accent1"/>
+              </a:buClr>
+              <a:buSzPct val="80000"/>
+              <a:buFont typeface="Wingdings 3" charset="2"/>
+              <a:buChar char=""/>
+              <a:defRPr sz="1200" b="0" i="0" kern="1200">
+                <a:solidFill>
+                  <a:schemeClr val="tx1">
+                    <a:lumMod val="75000"/>
+                    <a:lumOff val="25000"/>
+                  </a:schemeClr>
+                </a:solidFill>
+                <a:latin typeface="+mn-lt"/>
+                <a:ea typeface="+mn-ea"/>
+                <a:cs typeface="+mn-cs"/>
+              </a:defRPr>
+            </a:lvl4pPr>
+            <a:lvl5pPr marL="2057400" indent="-228600" algn="l" defTabSz="457200" rtl="0" eaLnBrk="1" latinLnBrk="0" hangingPunct="1">
+              <a:spcBef>
+                <a:spcPts val="1000"/>
+              </a:spcBef>
+              <a:spcAft>
+                <a:spcPts val="0"/>
+              </a:spcAft>
+              <a:buClr>
+                <a:schemeClr val="accent1"/>
+              </a:buClr>
+              <a:buSzPct val="80000"/>
+              <a:buFont typeface="Wingdings 3" charset="2"/>
+              <a:buChar char=""/>
+              <a:defRPr sz="1200" b="0" i="0" kern="1200">
+                <a:solidFill>
+                  <a:schemeClr val="tx1">
+                    <a:lumMod val="75000"/>
+                    <a:lumOff val="25000"/>
+                  </a:schemeClr>
+                </a:solidFill>
+                <a:latin typeface="+mn-lt"/>
+                <a:ea typeface="+mn-ea"/>
+                <a:cs typeface="+mn-cs"/>
+              </a:defRPr>
+            </a:lvl5pPr>
+            <a:lvl6pPr marL="2514600" indent="-228600" algn="l" defTabSz="457200" rtl="0" eaLnBrk="1" latinLnBrk="0" hangingPunct="1">
+              <a:spcBef>
+                <a:spcPts val="1000"/>
+              </a:spcBef>
+              <a:spcAft>
+                <a:spcPts val="0"/>
+              </a:spcAft>
+              <a:buClr>
+                <a:schemeClr val="accent1"/>
+              </a:buClr>
+              <a:buSzPct val="80000"/>
+              <a:buFont typeface="Wingdings 3" charset="2"/>
+              <a:buChar char=""/>
+              <a:defRPr sz="1200" b="0" i="0" kern="1200">
+                <a:solidFill>
+                  <a:schemeClr val="tx1">
+                    <a:lumMod val="75000"/>
+                    <a:lumOff val="25000"/>
+                  </a:schemeClr>
+                </a:solidFill>
+                <a:latin typeface="+mn-lt"/>
+                <a:ea typeface="+mn-ea"/>
+                <a:cs typeface="+mn-cs"/>
+              </a:defRPr>
+            </a:lvl6pPr>
+            <a:lvl7pPr marL="2971800" indent="-228600" algn="l" defTabSz="457200" rtl="0" eaLnBrk="1" latinLnBrk="0" hangingPunct="1">
+              <a:spcBef>
+                <a:spcPts val="1000"/>
+              </a:spcBef>
+              <a:spcAft>
+                <a:spcPts val="0"/>
+              </a:spcAft>
+              <a:buClr>
+                <a:schemeClr val="accent1"/>
+              </a:buClr>
+              <a:buSzPct val="80000"/>
+              <a:buFont typeface="Wingdings 3" charset="2"/>
+              <a:buChar char=""/>
+              <a:defRPr sz="1200" b="0" i="0" kern="1200">
+                <a:solidFill>
+                  <a:schemeClr val="tx1">
+                    <a:lumMod val="75000"/>
+                    <a:lumOff val="25000"/>
+                  </a:schemeClr>
+                </a:solidFill>
+                <a:latin typeface="+mn-lt"/>
+                <a:ea typeface="+mn-ea"/>
+                <a:cs typeface="+mn-cs"/>
+              </a:defRPr>
+            </a:lvl7pPr>
+            <a:lvl8pPr marL="3429000" indent="-228600" algn="l" defTabSz="457200" rtl="0" eaLnBrk="1" latinLnBrk="0" hangingPunct="1">
+              <a:spcBef>
+                <a:spcPts val="1000"/>
+              </a:spcBef>
+              <a:spcAft>
+                <a:spcPts val="0"/>
+              </a:spcAft>
+              <a:buClr>
+                <a:schemeClr val="accent1"/>
+              </a:buClr>
+              <a:buSzPct val="80000"/>
+              <a:buFont typeface="Wingdings 3" charset="2"/>
+              <a:buChar char=""/>
+              <a:defRPr sz="1200" b="0" i="0" kern="1200">
+                <a:solidFill>
+                  <a:schemeClr val="tx1">
+                    <a:lumMod val="75000"/>
+                    <a:lumOff val="25000"/>
+                  </a:schemeClr>
+                </a:solidFill>
+                <a:latin typeface="+mn-lt"/>
+                <a:ea typeface="+mn-ea"/>
+                <a:cs typeface="+mn-cs"/>
+              </a:defRPr>
+            </a:lvl8pPr>
+            <a:lvl9pPr marL="3886200" indent="-228600" algn="l" defTabSz="457200" rtl="0" eaLnBrk="1" latinLnBrk="0" hangingPunct="1">
+              <a:spcBef>
+                <a:spcPts val="1000"/>
+              </a:spcBef>
+              <a:spcAft>
+                <a:spcPts val="0"/>
+              </a:spcAft>
+              <a:buClr>
+                <a:schemeClr val="accent1"/>
+              </a:buClr>
+              <a:buSzPct val="80000"/>
+              <a:buFont typeface="Wingdings 3" charset="2"/>
+              <a:buChar char=""/>
+              <a:defRPr sz="1200" b="0" i="0" kern="1200">
+                <a:solidFill>
+                  <a:schemeClr val="tx1">
+                    <a:lumMod val="75000"/>
+                    <a:lumOff val="25000"/>
+                  </a:schemeClr>
+                </a:solidFill>
+                <a:latin typeface="+mn-lt"/>
+                <a:ea typeface="+mn-ea"/>
+                <a:cs typeface="+mn-cs"/>
+              </a:defRPr>
+            </a:lvl9pPr>
+          </a:lstStyle>
           <a:p>
             <a:endParaRPr lang="en-US" dirty="0"/>
           </a:p>
         </p:txBody>
       </p:sp>
+      <p:graphicFrame>
+        <p:nvGraphicFramePr>
+          <p:cNvPr id="9" name="Content Placeholder 6">
+            <a:extLst>
+              <a:ext uri="{FF2B5EF4-FFF2-40B4-BE49-F238E27FC236}">
+                <a16:creationId xmlns:a16="http://schemas.microsoft.com/office/drawing/2014/main" id="{70A0285A-BD96-D7FE-2B72-332E85712E7A}"/>
+              </a:ext>
+            </a:extLst>
+          </p:cNvPr>
+          <p:cNvGraphicFramePr>
+            <a:graphicFrameLocks/>
+          </p:cNvGraphicFramePr>
+          <p:nvPr>
+            <p:extLst>
+              <p:ext uri="{D42A27DB-BD31-4B8C-83A1-F6EECF244321}">
+                <p14:modId xmlns:p14="http://schemas.microsoft.com/office/powerpoint/2010/main" val="2041261801"/>
+              </p:ext>
+            </p:extLst>
+          </p:nvPr>
+        </p:nvGraphicFramePr>
+        <p:xfrm>
+          <a:off x="7004093" y="2476280"/>
+          <a:ext cx="4364037" cy="3319463"/>
+        </p:xfrm>
+        <a:graphic>
+          <a:graphicData uri="http://schemas.openxmlformats.org/drawingml/2006/chart">
+            <c:chart xmlns:c="http://schemas.openxmlformats.org/drawingml/2006/chart" xmlns:r="http://schemas.openxmlformats.org/officeDocument/2006/relationships" r:id="rId3"/>
+          </a:graphicData>
+        </a:graphic>
+      </p:graphicFrame>
     </p:spTree>
     <p:extLst>
       <p:ext uri="{BB962C8B-B14F-4D97-AF65-F5344CB8AC3E}">
-        <p14:creationId xmlns:p14="http://schemas.microsoft.com/office/powerpoint/2010/main" val="1098846926"/>
+        <p14:creationId xmlns:p14="http://schemas.microsoft.com/office/powerpoint/2010/main" val="3535128720"/>
       </p:ext>
     </p:extLst>
   </p:cSld>

</xml_diff>